<commit_message>
sync value read bug fixed
</commit_message>
<xml_diff>
--- a/DataStore.pptx
+++ b/DataStore.pptx
@@ -125,7 +125,7 @@
 </file>
 
 <file path=ppt/slideLayouts/slideLayout1.xml><?xml version="1.0" encoding="utf-8"?>
-<p:sldLayout xmlns:a="http://schemas.openxmlformats.org/drawingml/2006/main" xmlns:r="http://schemas.openxmlformats.org/officeDocument/2006/relationships" xmlns:p="http://schemas.openxmlformats.org/presentationml/2006/main" type="title" preserve="1">
+<p:sldLayout xmlns:a="http://schemas.openxmlformats.org/drawingml/2006/main" xmlns:r="http://schemas.openxmlformats.org/officeDocument/2006/relationships" xmlns:p="http://schemas.openxmlformats.org/presentationml/2006/main" showMasterSp="0" type="title" preserve="1">
   <p:cSld name="Title Slide">
     <p:spTree>
       <p:nvGrpSpPr>
@@ -333,6 +333,62 @@
           </a:p>
         </p:txBody>
       </p:sp>
+      <p:sp>
+        <p:nvSpPr>
+          <p:cNvPr id="7" name="Rectangle 6">
+            <a:extLst>
+              <a:ext uri="{FF2B5EF4-FFF2-40B4-BE49-F238E27FC236}">
+                <a16:creationId xmlns:a16="http://schemas.microsoft.com/office/drawing/2014/main" id="{062B5A0B-4348-4344-8079-B766F50CF772}"/>
+              </a:ext>
+            </a:extLst>
+          </p:cNvPr>
+          <p:cNvSpPr/>
+          <p:nvPr userDrawn="1"/>
+        </p:nvSpPr>
+        <p:spPr>
+          <a:xfrm>
+            <a:off x="11219935" y="284205"/>
+            <a:ext cx="556054" cy="679622"/>
+          </a:xfrm>
+          <a:prstGeom prst="rect">
+            <a:avLst/>
+          </a:prstGeom>
+          <a:blipFill dpi="0" rotWithShape="1">
+            <a:blip r:embed="rId2"/>
+            <a:srcRect/>
+            <a:stretch>
+              <a:fillRect/>
+            </a:stretch>
+          </a:blipFill>
+          <a:ln>
+            <a:noFill/>
+          </a:ln>
+        </p:spPr>
+        <p:style>
+          <a:lnRef idx="2">
+            <a:schemeClr val="accent1">
+              <a:shade val="50000"/>
+            </a:schemeClr>
+          </a:lnRef>
+          <a:fillRef idx="1">
+            <a:schemeClr val="accent1"/>
+          </a:fillRef>
+          <a:effectRef idx="0">
+            <a:schemeClr val="accent1"/>
+          </a:effectRef>
+          <a:fontRef idx="minor">
+            <a:schemeClr val="lt1"/>
+          </a:fontRef>
+        </p:style>
+        <p:txBody>
+          <a:bodyPr rtlCol="0" anchor="ctr"/>
+          <a:lstStyle/>
+          <a:p>
+            <a:pPr algn="ctr"/>
+            <a:endParaRPr lang="en-US"/>
+          </a:p>
+        </p:txBody>
+      </p:sp>
     </p:spTree>
     <p:extLst>
       <p:ext uri="{BB962C8B-B14F-4D97-AF65-F5344CB8AC3E}">
@@ -347,7 +403,7 @@
 </file>
 
 <file path=ppt/slideLayouts/slideLayout10.xml><?xml version="1.0" encoding="utf-8"?>
-<p:sldLayout xmlns:a="http://schemas.openxmlformats.org/drawingml/2006/main" xmlns:r="http://schemas.openxmlformats.org/officeDocument/2006/relationships" xmlns:p="http://schemas.openxmlformats.org/presentationml/2006/main" type="vertTx" preserve="1">
+<p:sldLayout xmlns:a="http://schemas.openxmlformats.org/drawingml/2006/main" xmlns:r="http://schemas.openxmlformats.org/officeDocument/2006/relationships" xmlns:p="http://schemas.openxmlformats.org/presentationml/2006/main" showMasterSp="0" type="vertTx" preserve="1">
   <p:cSld name="Title and Vertical Text">
     <p:spTree>
       <p:nvGrpSpPr>
@@ -547,7 +603,7 @@
 </file>
 
 <file path=ppt/slideLayouts/slideLayout11.xml><?xml version="1.0" encoding="utf-8"?>
-<p:sldLayout xmlns:a="http://schemas.openxmlformats.org/drawingml/2006/main" xmlns:r="http://schemas.openxmlformats.org/officeDocument/2006/relationships" xmlns:p="http://schemas.openxmlformats.org/presentationml/2006/main" type="vertTitleAndTx" preserve="1">
+<p:sldLayout xmlns:a="http://schemas.openxmlformats.org/drawingml/2006/main" xmlns:r="http://schemas.openxmlformats.org/officeDocument/2006/relationships" xmlns:p="http://schemas.openxmlformats.org/presentationml/2006/main" showMasterSp="0" type="vertTitleAndTx" preserve="1">
   <p:cSld name="Vertical Title and Text">
     <p:spTree>
       <p:nvGrpSpPr>
@@ -757,7 +813,7 @@
 </file>
 
 <file path=ppt/slideLayouts/slideLayout2.xml><?xml version="1.0" encoding="utf-8"?>
-<p:sldLayout xmlns:a="http://schemas.openxmlformats.org/drawingml/2006/main" xmlns:r="http://schemas.openxmlformats.org/officeDocument/2006/relationships" xmlns:p="http://schemas.openxmlformats.org/presentationml/2006/main" type="obj" preserve="1">
+<p:sldLayout xmlns:a="http://schemas.openxmlformats.org/drawingml/2006/main" xmlns:r="http://schemas.openxmlformats.org/officeDocument/2006/relationships" xmlns:p="http://schemas.openxmlformats.org/presentationml/2006/main" showMasterSp="0" type="obj" preserve="1">
   <p:cSld name="Title and Content">
     <p:spTree>
       <p:nvGrpSpPr>
@@ -883,7 +939,7 @@
           <a:p>
             <a:fld id="{1B74956C-C24C-CA49-8E6A-9F18C21F9F36}" type="datetimeFigureOut">
               <a:rPr lang="en-US" smtClean="0"/>
-              <a:t>6/29/21</a:t>
+              <a:t>7/1/21</a:t>
             </a:fld>
             <a:endParaRPr lang="en-US"/>
           </a:p>
@@ -943,6 +999,44 @@
           </a:p>
         </p:txBody>
       </p:sp>
+      <p:pic>
+        <p:nvPicPr>
+          <p:cNvPr id="7" name="Picture 6">
+            <a:extLst>
+              <a:ext uri="{FF2B5EF4-FFF2-40B4-BE49-F238E27FC236}">
+                <a16:creationId xmlns:a16="http://schemas.microsoft.com/office/drawing/2014/main" id="{D40BF2B1-ED1C-6D4B-8DA3-57101795AE65}"/>
+              </a:ext>
+            </a:extLst>
+          </p:cNvPr>
+          <p:cNvPicPr>
+            <a:picLocks noChangeAspect="1"/>
+          </p:cNvPicPr>
+          <p:nvPr userDrawn="1"/>
+        </p:nvPicPr>
+        <p:blipFill>
+          <a:blip r:embed="rId2" cstate="email">
+            <a:alphaModFix/>
+            <a:extLst>
+              <a:ext uri="{28A0092B-C50C-407E-A947-70E740481C1C}">
+                <a14:useLocalDpi xmlns:a14="http://schemas.microsoft.com/office/drawing/2010/main"/>
+              </a:ext>
+            </a:extLst>
+          </a:blip>
+          <a:stretch>
+            <a:fillRect/>
+          </a:stretch>
+        </p:blipFill>
+        <p:spPr>
+          <a:xfrm>
+            <a:off x="11518234" y="253071"/>
+            <a:ext cx="360000" cy="459781"/>
+          </a:xfrm>
+          <a:prstGeom prst="rect">
+            <a:avLst/>
+          </a:prstGeom>
+          <a:noFill/>
+        </p:spPr>
+      </p:pic>
     </p:spTree>
     <p:extLst>
       <p:ext uri="{BB962C8B-B14F-4D97-AF65-F5344CB8AC3E}">
@@ -957,7 +1051,7 @@
 </file>
 
 <file path=ppt/slideLayouts/slideLayout3.xml><?xml version="1.0" encoding="utf-8"?>
-<p:sldLayout xmlns:a="http://schemas.openxmlformats.org/drawingml/2006/main" xmlns:r="http://schemas.openxmlformats.org/officeDocument/2006/relationships" xmlns:p="http://schemas.openxmlformats.org/presentationml/2006/main" type="secHead" preserve="1">
+<p:sldLayout xmlns:a="http://schemas.openxmlformats.org/drawingml/2006/main" xmlns:r="http://schemas.openxmlformats.org/officeDocument/2006/relationships" xmlns:p="http://schemas.openxmlformats.org/presentationml/2006/main" showMasterSp="0" type="secHead" preserve="1">
   <p:cSld name="Section Header">
     <p:spTree>
       <p:nvGrpSpPr>
@@ -1233,7 +1327,7 @@
 </file>
 
 <file path=ppt/slideLayouts/slideLayout4.xml><?xml version="1.0" encoding="utf-8"?>
-<p:sldLayout xmlns:a="http://schemas.openxmlformats.org/drawingml/2006/main" xmlns:r="http://schemas.openxmlformats.org/officeDocument/2006/relationships" xmlns:p="http://schemas.openxmlformats.org/presentationml/2006/main" type="twoObj" preserve="1">
+<p:sldLayout xmlns:a="http://schemas.openxmlformats.org/drawingml/2006/main" xmlns:r="http://schemas.openxmlformats.org/officeDocument/2006/relationships" xmlns:p="http://schemas.openxmlformats.org/presentationml/2006/main" showMasterSp="0" type="twoObj" preserve="1">
   <p:cSld name="Two Content">
     <p:spTree>
       <p:nvGrpSpPr>
@@ -1501,7 +1595,7 @@
 </file>
 
 <file path=ppt/slideLayouts/slideLayout5.xml><?xml version="1.0" encoding="utf-8"?>
-<p:sldLayout xmlns:a="http://schemas.openxmlformats.org/drawingml/2006/main" xmlns:r="http://schemas.openxmlformats.org/officeDocument/2006/relationships" xmlns:p="http://schemas.openxmlformats.org/presentationml/2006/main" type="twoTxTwoObj" preserve="1">
+<p:sldLayout xmlns:a="http://schemas.openxmlformats.org/drawingml/2006/main" xmlns:r="http://schemas.openxmlformats.org/officeDocument/2006/relationships" xmlns:p="http://schemas.openxmlformats.org/presentationml/2006/main" showMasterSp="0" type="twoTxTwoObj" preserve="1">
   <p:cSld name="Comparison">
     <p:spTree>
       <p:nvGrpSpPr>
@@ -1916,7 +2010,7 @@
 </file>
 
 <file path=ppt/slideLayouts/slideLayout6.xml><?xml version="1.0" encoding="utf-8"?>
-<p:sldLayout xmlns:a="http://schemas.openxmlformats.org/drawingml/2006/main" xmlns:r="http://schemas.openxmlformats.org/officeDocument/2006/relationships" xmlns:p="http://schemas.openxmlformats.org/presentationml/2006/main" type="titleOnly" preserve="1">
+<p:sldLayout xmlns:a="http://schemas.openxmlformats.org/drawingml/2006/main" xmlns:r="http://schemas.openxmlformats.org/officeDocument/2006/relationships" xmlns:p="http://schemas.openxmlformats.org/presentationml/2006/main" showMasterSp="0" type="titleOnly" preserve="1">
   <p:cSld name="Title Only">
     <p:spTree>
       <p:nvGrpSpPr>
@@ -2058,7 +2152,7 @@
 </file>
 
 <file path=ppt/slideLayouts/slideLayout7.xml><?xml version="1.0" encoding="utf-8"?>
-<p:sldLayout xmlns:a="http://schemas.openxmlformats.org/drawingml/2006/main" xmlns:r="http://schemas.openxmlformats.org/officeDocument/2006/relationships" xmlns:p="http://schemas.openxmlformats.org/presentationml/2006/main" type="blank" preserve="1">
+<p:sldLayout xmlns:a="http://schemas.openxmlformats.org/drawingml/2006/main" xmlns:r="http://schemas.openxmlformats.org/officeDocument/2006/relationships" xmlns:p="http://schemas.openxmlformats.org/presentationml/2006/main" showMasterSp="0" type="blank" preserve="1">
   <p:cSld name="Blank">
     <p:spTree>
       <p:nvGrpSpPr>
@@ -2171,7 +2265,7 @@
 </file>
 
 <file path=ppt/slideLayouts/slideLayout8.xml><?xml version="1.0" encoding="utf-8"?>
-<p:sldLayout xmlns:a="http://schemas.openxmlformats.org/drawingml/2006/main" xmlns:r="http://schemas.openxmlformats.org/officeDocument/2006/relationships" xmlns:p="http://schemas.openxmlformats.org/presentationml/2006/main" type="objTx" preserve="1">
+<p:sldLayout xmlns:a="http://schemas.openxmlformats.org/drawingml/2006/main" xmlns:r="http://schemas.openxmlformats.org/officeDocument/2006/relationships" xmlns:p="http://schemas.openxmlformats.org/presentationml/2006/main" showMasterSp="0" type="objTx" preserve="1">
   <p:cSld name="Content with Caption">
     <p:spTree>
       <p:nvGrpSpPr>
@@ -2484,7 +2578,7 @@
 </file>
 
 <file path=ppt/slideLayouts/slideLayout9.xml><?xml version="1.0" encoding="utf-8"?>
-<p:sldLayout xmlns:a="http://schemas.openxmlformats.org/drawingml/2006/main" xmlns:r="http://schemas.openxmlformats.org/officeDocument/2006/relationships" xmlns:p="http://schemas.openxmlformats.org/presentationml/2006/main" type="picTx" preserve="1">
+<p:sldLayout xmlns:a="http://schemas.openxmlformats.org/drawingml/2006/main" xmlns:r="http://schemas.openxmlformats.org/officeDocument/2006/relationships" xmlns:p="http://schemas.openxmlformats.org/presentationml/2006/main" showMasterSp="0" type="picTx" preserve="1">
   <p:cSld name="Picture with Caption">
     <p:spTree>
       <p:nvGrpSpPr>
@@ -2776,9 +2870,21 @@
 <p:sldMaster xmlns:a="http://schemas.openxmlformats.org/drawingml/2006/main" xmlns:r="http://schemas.openxmlformats.org/officeDocument/2006/relationships" xmlns:p="http://schemas.openxmlformats.org/presentationml/2006/main">
   <p:cSld>
     <p:bg>
-      <p:bgRef idx="1001">
-        <a:schemeClr val="bg1"/>
-      </p:bgRef>
+      <p:bgPr>
+        <a:gradFill flip="none" rotWithShape="1">
+          <a:gsLst>
+            <a:gs pos="0">
+              <a:srgbClr val="003478"/>
+            </a:gs>
+            <a:gs pos="100000">
+              <a:srgbClr val="0089C4"/>
+            </a:gs>
+          </a:gsLst>
+          <a:lin ang="2100000" scaled="1"/>
+          <a:tileRect/>
+        </a:gradFill>
+        <a:effectLst/>
+      </p:bgPr>
     </p:bg>
     <p:spTree>
       <p:nvGrpSpPr>
@@ -2942,7 +3048,7 @@
           <a:p>
             <a:fld id="{1B74956C-C24C-CA49-8E6A-9F18C21F9F36}" type="datetimeFigureOut">
               <a:rPr lang="en-US" smtClean="0"/>
-              <a:t>6/29/21</a:t>
+              <a:t>7/1/21</a:t>
             </a:fld>
             <a:endParaRPr lang="en-US"/>
           </a:p>
@@ -3034,6 +3140,61 @@
               <a:rPr lang="en-US" smtClean="0"/>
               <a:t>‹#›</a:t>
             </a:fld>
+            <a:endParaRPr lang="en-US"/>
+          </a:p>
+        </p:txBody>
+      </p:sp>
+      <p:sp>
+        <p:nvSpPr>
+          <p:cNvPr id="8" name="Rectangle 7">
+            <a:extLst>
+              <a:ext uri="{FF2B5EF4-FFF2-40B4-BE49-F238E27FC236}">
+                <a16:creationId xmlns:a16="http://schemas.microsoft.com/office/drawing/2014/main" id="{09CB4D38-CBF1-A64F-889F-C63913FC68AE}"/>
+              </a:ext>
+            </a:extLst>
+          </p:cNvPr>
+          <p:cNvSpPr/>
+          <p:nvPr userDrawn="1"/>
+        </p:nvSpPr>
+        <p:spPr>
+          <a:xfrm>
+            <a:off x="11491784" y="365125"/>
+            <a:ext cx="494270" cy="623416"/>
+          </a:xfrm>
+          <a:prstGeom prst="rect">
+            <a:avLst/>
+          </a:prstGeom>
+          <a:blipFill>
+            <a:blip r:embed="rId13"/>
+            <a:stretch>
+              <a:fillRect/>
+            </a:stretch>
+          </a:blipFill>
+          <a:ln>
+            <a:noFill/>
+          </a:ln>
+        </p:spPr>
+        <p:style>
+          <a:lnRef idx="2">
+            <a:schemeClr val="accent1">
+              <a:shade val="50000"/>
+            </a:schemeClr>
+          </a:lnRef>
+          <a:fillRef idx="1">
+            <a:schemeClr val="accent1"/>
+          </a:fillRef>
+          <a:effectRef idx="0">
+            <a:schemeClr val="accent1"/>
+          </a:effectRef>
+          <a:fontRef idx="minor">
+            <a:schemeClr val="lt1"/>
+          </a:fontRef>
+        </p:style>
+        <p:txBody>
+          <a:bodyPr rtlCol="0" anchor="ctr"/>
+          <a:lstStyle/>
+          <a:p>
+            <a:pPr algn="ctr"/>
             <a:endParaRPr lang="en-US"/>
           </a:p>
         </p:txBody>
@@ -3343,7 +3504,7 @@
 </file>
 
 <file path=ppt/slides/slide1.xml><?xml version="1.0" encoding="utf-8"?>
-<p:sld xmlns:a="http://schemas.openxmlformats.org/drawingml/2006/main" xmlns:r="http://schemas.openxmlformats.org/officeDocument/2006/relationships" xmlns:p="http://schemas.openxmlformats.org/presentationml/2006/main">
+<p:sld xmlns:a="http://schemas.openxmlformats.org/drawingml/2006/main" xmlns:r="http://schemas.openxmlformats.org/officeDocument/2006/relationships" xmlns:p="http://schemas.openxmlformats.org/presentationml/2006/main" showMasterSp="0">
   <p:cSld>
     <p:spTree>
       <p:nvGrpSpPr>
@@ -3386,7 +3547,11 @@
           <a:lstStyle/>
           <a:p>
             <a:r>
-              <a:rPr lang="en-US" dirty="0"/>
+              <a:rPr lang="en-US" dirty="0">
+                <a:solidFill>
+                  <a:schemeClr val="bg1"/>
+                </a:solidFill>
+              </a:rPr>
               <a:t>Data Store Android</a:t>
             </a:r>
           </a:p>
@@ -3406,7 +3571,7 @@
 </file>
 
 <file path=ppt/slides/slide10.xml><?xml version="1.0" encoding="utf-8"?>
-<p:sld xmlns:a="http://schemas.openxmlformats.org/drawingml/2006/main" xmlns:r="http://schemas.openxmlformats.org/officeDocument/2006/relationships" xmlns:p="http://schemas.openxmlformats.org/presentationml/2006/main">
+<p:sld xmlns:a="http://schemas.openxmlformats.org/drawingml/2006/main" xmlns:r="http://schemas.openxmlformats.org/officeDocument/2006/relationships" xmlns:p="http://schemas.openxmlformats.org/presentationml/2006/main" showMasterSp="0">
   <p:cSld>
     <p:spTree>
       <p:nvGrpSpPr>
@@ -3444,7 +3609,11 @@
           <a:lstStyle/>
           <a:p>
             <a:r>
-              <a:rPr lang="en-US" dirty="0"/>
+              <a:rPr lang="en-US" dirty="0">
+                <a:solidFill>
+                  <a:schemeClr val="bg1"/>
+                </a:solidFill>
+              </a:rPr>
               <a:t>Migration</a:t>
             </a:r>
           </a:p>
@@ -3496,7 +3665,7 @@
 </file>
 
 <file path=ppt/slides/slide11.xml><?xml version="1.0" encoding="utf-8"?>
-<p:sld xmlns:a="http://schemas.openxmlformats.org/drawingml/2006/main" xmlns:r="http://schemas.openxmlformats.org/officeDocument/2006/relationships" xmlns:p="http://schemas.openxmlformats.org/presentationml/2006/main">
+<p:sld xmlns:a="http://schemas.openxmlformats.org/drawingml/2006/main" xmlns:r="http://schemas.openxmlformats.org/officeDocument/2006/relationships" xmlns:p="http://schemas.openxmlformats.org/presentationml/2006/main" showMasterSp="0">
   <p:cSld>
     <p:spTree>
       <p:nvGrpSpPr>
@@ -3540,7 +3709,11 @@
           <a:p>
             <a:pPr algn="ctr"/>
             <a:r>
-              <a:rPr lang="en-US" dirty="0"/>
+              <a:rPr lang="en-US" dirty="0">
+                <a:solidFill>
+                  <a:schemeClr val="bg1"/>
+                </a:solidFill>
+              </a:rPr>
               <a:t>Demo</a:t>
             </a:r>
           </a:p>
@@ -3560,7 +3733,7 @@
 </file>
 
 <file path=ppt/slides/slide12.xml><?xml version="1.0" encoding="utf-8"?>
-<p:sld xmlns:a="http://schemas.openxmlformats.org/drawingml/2006/main" xmlns:r="http://schemas.openxmlformats.org/officeDocument/2006/relationships" xmlns:p="http://schemas.openxmlformats.org/presentationml/2006/main">
+<p:sld xmlns:a="http://schemas.openxmlformats.org/drawingml/2006/main" xmlns:r="http://schemas.openxmlformats.org/officeDocument/2006/relationships" xmlns:p="http://schemas.openxmlformats.org/presentationml/2006/main" showMasterSp="0">
   <p:cSld>
     <p:spTree>
       <p:nvGrpSpPr>
@@ -3604,7 +3777,11 @@
           <a:p>
             <a:pPr algn="ctr"/>
             <a:r>
-              <a:rPr lang="en-US" dirty="0"/>
+              <a:rPr lang="en-US" dirty="0">
+                <a:solidFill>
+                  <a:schemeClr val="bg1"/>
+                </a:solidFill>
+              </a:rPr>
               <a:t>Questions?</a:t>
             </a:r>
           </a:p>
@@ -3624,7 +3801,7 @@
 </file>
 
 <file path=ppt/slides/slide13.xml><?xml version="1.0" encoding="utf-8"?>
-<p:sld xmlns:a="http://schemas.openxmlformats.org/drawingml/2006/main" xmlns:r="http://schemas.openxmlformats.org/officeDocument/2006/relationships" xmlns:p="http://schemas.openxmlformats.org/presentationml/2006/main">
+<p:sld xmlns:a="http://schemas.openxmlformats.org/drawingml/2006/main" xmlns:r="http://schemas.openxmlformats.org/officeDocument/2006/relationships" xmlns:p="http://schemas.openxmlformats.org/presentationml/2006/main" showMasterSp="0">
   <p:cSld>
     <p:spTree>
       <p:nvGrpSpPr>
@@ -3668,7 +3845,11 @@
           <a:p>
             <a:pPr algn="ctr"/>
             <a:r>
-              <a:rPr lang="en-US" dirty="0"/>
+              <a:rPr lang="en-US" dirty="0">
+                <a:solidFill>
+                  <a:schemeClr val="bg1"/>
+                </a:solidFill>
+              </a:rPr>
               <a:t>Thank you!</a:t>
             </a:r>
           </a:p>
@@ -3688,7 +3869,7 @@
 </file>
 
 <file path=ppt/slides/slide2.xml><?xml version="1.0" encoding="utf-8"?>
-<p:sld xmlns:a="http://schemas.openxmlformats.org/drawingml/2006/main" xmlns:r="http://schemas.openxmlformats.org/officeDocument/2006/relationships" xmlns:p="http://schemas.openxmlformats.org/presentationml/2006/main">
+<p:sld xmlns:a="http://schemas.openxmlformats.org/drawingml/2006/main" xmlns:r="http://schemas.openxmlformats.org/officeDocument/2006/relationships" xmlns:p="http://schemas.openxmlformats.org/presentationml/2006/main" showMasterSp="0">
   <p:cSld>
     <p:spTree>
       <p:nvGrpSpPr>
@@ -3731,37 +3912,61 @@
           <a:lstStyle/>
           <a:p>
             <a:r>
-              <a:rPr lang="en-US" dirty="0"/>
+              <a:rPr lang="en-US" dirty="0">
+                <a:solidFill>
+                  <a:schemeClr val="bg1"/>
+                </a:solidFill>
+              </a:rPr>
               <a:t>Basics</a:t>
             </a:r>
           </a:p>
           <a:p>
             <a:r>
-              <a:rPr lang="en-US" dirty="0"/>
+              <a:rPr lang="en-US" dirty="0">
+                <a:solidFill>
+                  <a:schemeClr val="bg1"/>
+                </a:solidFill>
+              </a:rPr>
               <a:t>Why to migrate?</a:t>
             </a:r>
           </a:p>
           <a:p>
             <a:r>
-              <a:rPr lang="en-US" dirty="0"/>
+              <a:rPr lang="en-US" dirty="0">
+                <a:solidFill>
+                  <a:schemeClr val="bg1"/>
+                </a:solidFill>
+              </a:rPr>
               <a:t>Setup</a:t>
             </a:r>
           </a:p>
           <a:p>
             <a:r>
-              <a:rPr lang="en-US" dirty="0"/>
+              <a:rPr lang="en-US" dirty="0">
+                <a:solidFill>
+                  <a:schemeClr val="bg1"/>
+                </a:solidFill>
+              </a:rPr>
               <a:t>Read/write</a:t>
             </a:r>
           </a:p>
           <a:p>
             <a:r>
-              <a:rPr lang="en-US" dirty="0"/>
+              <a:rPr lang="en-US" dirty="0">
+                <a:solidFill>
+                  <a:schemeClr val="bg1"/>
+                </a:solidFill>
+              </a:rPr>
               <a:t>Demo</a:t>
             </a:r>
           </a:p>
           <a:p>
             <a:r>
-              <a:rPr lang="en-US" dirty="0"/>
+              <a:rPr lang="en-US" dirty="0">
+                <a:solidFill>
+                  <a:schemeClr val="bg1"/>
+                </a:solidFill>
+              </a:rPr>
               <a:t>Questions?</a:t>
             </a:r>
           </a:p>
@@ -3781,7 +3986,7 @@
 </file>
 
 <file path=ppt/slides/slide3.xml><?xml version="1.0" encoding="utf-8"?>
-<p:sld xmlns:a="http://schemas.openxmlformats.org/drawingml/2006/main" xmlns:r="http://schemas.openxmlformats.org/officeDocument/2006/relationships" xmlns:p="http://schemas.openxmlformats.org/presentationml/2006/main">
+<p:sld xmlns:a="http://schemas.openxmlformats.org/drawingml/2006/main" xmlns:r="http://schemas.openxmlformats.org/officeDocument/2006/relationships" xmlns:p="http://schemas.openxmlformats.org/presentationml/2006/main" showMasterSp="0">
   <p:cSld>
     <p:spTree>
       <p:nvGrpSpPr>
@@ -3819,7 +4024,11 @@
           <a:lstStyle/>
           <a:p>
             <a:r>
-              <a:rPr lang="en-US" dirty="0"/>
+              <a:rPr lang="en-US" dirty="0">
+                <a:solidFill>
+                  <a:schemeClr val="bg1"/>
+                </a:solidFill>
+              </a:rPr>
               <a:t>Data Store</a:t>
             </a:r>
           </a:p>
@@ -3849,14 +4058,26 @@
           <a:lstStyle/>
           <a:p>
             <a:r>
-              <a:rPr lang="en-IN" dirty="0"/>
+              <a:rPr lang="en-IN" dirty="0">
+                <a:solidFill>
+                  <a:schemeClr val="bg1"/>
+                </a:solidFill>
+              </a:rPr>
               <a:t>Latest way to store preference/typed objects</a:t>
             </a:r>
             <a:br>
-              <a:rPr lang="en-IN" dirty="0"/>
+              <a:rPr lang="en-IN" dirty="0">
+                <a:solidFill>
+                  <a:schemeClr val="bg1"/>
+                </a:solidFill>
+              </a:rPr>
             </a:br>
             <a:r>
-              <a:rPr lang="en-IN" dirty="0"/>
+              <a:rPr lang="en-IN" dirty="0">
+                <a:solidFill>
+                  <a:schemeClr val="bg1"/>
+                </a:solidFill>
+              </a:rPr>
               <a:t>-Its a data storage solution that allows you to store key-value pairs or typed objects</a:t>
             </a:r>
           </a:p>
@@ -3864,18 +4085,34 @@
             <a:pPr marL="0" indent="0">
               <a:buNone/>
             </a:pPr>
-            <a:endParaRPr lang="en-IN" dirty="0"/>
-          </a:p>
-          <a:p>
-            <a:r>
-              <a:rPr lang="en-IN" dirty="0"/>
+            <a:endParaRPr lang="en-IN" dirty="0">
+              <a:solidFill>
+                <a:schemeClr val="bg1"/>
+              </a:solidFill>
+            </a:endParaRPr>
+          </a:p>
+          <a:p>
+            <a:r>
+              <a:rPr lang="en-IN" dirty="0">
+                <a:solidFill>
+                  <a:schemeClr val="bg1"/>
+                </a:solidFill>
+              </a:rPr>
               <a:t>Its not a Database.</a:t>
             </a:r>
             <a:br>
-              <a:rPr lang="en-IN" dirty="0"/>
+              <a:rPr lang="en-IN" dirty="0">
+                <a:solidFill>
+                  <a:schemeClr val="bg1"/>
+                </a:solidFill>
+              </a:rPr>
             </a:br>
             <a:r>
-              <a:rPr lang="en-IN" dirty="0"/>
+              <a:rPr lang="en-IN" dirty="0">
+                <a:solidFill>
+                  <a:schemeClr val="bg1"/>
+                </a:solidFill>
+              </a:rPr>
               <a:t>- Ideal for small, simple datasets and does not support partial updates or referential integrity</a:t>
             </a:r>
           </a:p>
@@ -3884,9 +4121,17 @@
               <a:buNone/>
             </a:pPr>
             <a:br>
-              <a:rPr lang="en-US" dirty="0"/>
+              <a:rPr lang="en-US" dirty="0">
+                <a:solidFill>
+                  <a:schemeClr val="bg1"/>
+                </a:solidFill>
+              </a:rPr>
             </a:br>
-            <a:endParaRPr lang="en-US" dirty="0"/>
+            <a:endParaRPr lang="en-US" dirty="0">
+              <a:solidFill>
+                <a:schemeClr val="bg1"/>
+              </a:solidFill>
+            </a:endParaRPr>
           </a:p>
         </p:txBody>
       </p:sp>
@@ -3904,16 +4149,8 @@
 </file>
 
 <file path=ppt/slides/slide4.xml><?xml version="1.0" encoding="utf-8"?>
-<p:sld xmlns:a="http://schemas.openxmlformats.org/drawingml/2006/main" xmlns:r="http://schemas.openxmlformats.org/officeDocument/2006/relationships" xmlns:p="http://schemas.openxmlformats.org/presentationml/2006/main">
+<p:sld xmlns:a="http://schemas.openxmlformats.org/drawingml/2006/main" xmlns:r="http://schemas.openxmlformats.org/officeDocument/2006/relationships" xmlns:p="http://schemas.openxmlformats.org/presentationml/2006/main" showMasterSp="0">
   <p:cSld>
-    <p:bg>
-      <p:bgPr>
-        <a:solidFill>
-          <a:schemeClr val="bg1"/>
-        </a:solidFill>
-        <a:effectLst/>
-      </p:bgPr>
-    </p:bg>
     <p:spTree>
       <p:nvGrpSpPr>
         <p:cNvPr id="1" name=""/>
@@ -3959,7 +4196,7 @@
             <a:r>
               <a:rPr lang="en-US" sz="5400" kern="1200" dirty="0">
                 <a:solidFill>
-                  <a:schemeClr val="tx1"/>
+                  <a:schemeClr val="bg1"/>
                 </a:solidFill>
                 <a:latin typeface="+mj-lt"/>
                 <a:ea typeface="+mj-ea"/>
@@ -4016,7 +4253,7 @@
 </file>
 
 <file path=ppt/slides/slide5.xml><?xml version="1.0" encoding="utf-8"?>
-<p:sld xmlns:a="http://schemas.openxmlformats.org/drawingml/2006/main" xmlns:r="http://schemas.openxmlformats.org/officeDocument/2006/relationships" xmlns:p="http://schemas.openxmlformats.org/presentationml/2006/main">
+<p:sld xmlns:a="http://schemas.openxmlformats.org/drawingml/2006/main" xmlns:r="http://schemas.openxmlformats.org/officeDocument/2006/relationships" xmlns:p="http://schemas.openxmlformats.org/presentationml/2006/main" showMasterSp="0">
   <p:cSld>
     <p:spTree>
       <p:nvGrpSpPr>
@@ -4061,7 +4298,11 @@
           <a:lstStyle/>
           <a:p>
             <a:r>
-              <a:rPr lang="en-US" dirty="0"/>
+              <a:rPr lang="en-US" dirty="0">
+                <a:solidFill>
+                  <a:schemeClr val="bg1"/>
+                </a:solidFill>
+              </a:rPr>
               <a:t>Data Store Preference</a:t>
             </a:r>
           </a:p>
@@ -4126,10 +4367,18 @@
           <a:lstStyle/>
           <a:p>
             <a:r>
-              <a:rPr lang="en-US" sz="4400" dirty="0"/>
+              <a:rPr lang="en-US" sz="4400" dirty="0">
+                <a:solidFill>
+                  <a:schemeClr val="bg1"/>
+                </a:solidFill>
+              </a:rPr>
               <a:t>Setup</a:t>
             </a:r>
-            <a:endParaRPr lang="en-US" sz="2800" dirty="0"/>
+            <a:endParaRPr lang="en-US" sz="2800" dirty="0">
+              <a:solidFill>
+                <a:schemeClr val="bg1"/>
+              </a:solidFill>
+            </a:endParaRPr>
           </a:p>
         </p:txBody>
       </p:sp>
@@ -4192,7 +4441,11 @@
           <a:lstStyle/>
           <a:p>
             <a:r>
-              <a:rPr lang="en-US" dirty="0"/>
+              <a:rPr lang="en-US" dirty="0">
+                <a:solidFill>
+                  <a:schemeClr val="bg1"/>
+                </a:solidFill>
+              </a:rPr>
               <a:t>Data Store Typed</a:t>
             </a:r>
           </a:p>
@@ -4212,7 +4465,7 @@
 </file>
 
 <file path=ppt/slides/slide6.xml><?xml version="1.0" encoding="utf-8"?>
-<p:sld xmlns:a="http://schemas.openxmlformats.org/drawingml/2006/main" xmlns:r="http://schemas.openxmlformats.org/officeDocument/2006/relationships" xmlns:p="http://schemas.openxmlformats.org/presentationml/2006/main">
+<p:sld xmlns:a="http://schemas.openxmlformats.org/drawingml/2006/main" xmlns:r="http://schemas.openxmlformats.org/officeDocument/2006/relationships" xmlns:p="http://schemas.openxmlformats.org/presentationml/2006/main" showMasterSp="0">
   <p:cSld>
     <p:spTree>
       <p:nvGrpSpPr>
@@ -4285,10 +4538,13 @@
           <a:lstStyle/>
           <a:p>
             <a:r>
-              <a:rPr lang="en-US"/>
+              <a:rPr lang="en-US" dirty="0">
+                <a:solidFill>
+                  <a:schemeClr val="bg1"/>
+                </a:solidFill>
+              </a:rPr>
               <a:t>Create Data Store Preference</a:t>
             </a:r>
-            <a:endParaRPr lang="en-US" dirty="0"/>
           </a:p>
         </p:txBody>
       </p:sp>
@@ -4306,7 +4562,7 @@
 </file>
 
 <file path=ppt/slides/slide7.xml><?xml version="1.0" encoding="utf-8"?>
-<p:sld xmlns:a="http://schemas.openxmlformats.org/drawingml/2006/main" xmlns:r="http://schemas.openxmlformats.org/officeDocument/2006/relationships" xmlns:p="http://schemas.openxmlformats.org/presentationml/2006/main">
+<p:sld xmlns:a="http://schemas.openxmlformats.org/drawingml/2006/main" xmlns:r="http://schemas.openxmlformats.org/officeDocument/2006/relationships" xmlns:p="http://schemas.openxmlformats.org/presentationml/2006/main" showMasterSp="0">
   <p:cSld>
     <p:spTree>
       <p:nvGrpSpPr>
@@ -4344,10 +4600,13 @@
           <a:lstStyle/>
           <a:p>
             <a:r>
-              <a:rPr lang="en-US"/>
+              <a:rPr lang="en-US" dirty="0">
+                <a:solidFill>
+                  <a:schemeClr val="bg1"/>
+                </a:solidFill>
+              </a:rPr>
               <a:t>Define Preferences Key</a:t>
             </a:r>
-            <a:endParaRPr lang="en-US" dirty="0"/>
           </a:p>
         </p:txBody>
       </p:sp>
@@ -4394,7 +4653,7 @@
 </file>
 
 <file path=ppt/slides/slide8.xml><?xml version="1.0" encoding="utf-8"?>
-<p:sld xmlns:a="http://schemas.openxmlformats.org/drawingml/2006/main" xmlns:r="http://schemas.openxmlformats.org/officeDocument/2006/relationships" xmlns:p="http://schemas.openxmlformats.org/presentationml/2006/main">
+<p:sld xmlns:a="http://schemas.openxmlformats.org/drawingml/2006/main" xmlns:r="http://schemas.openxmlformats.org/officeDocument/2006/relationships" xmlns:p="http://schemas.openxmlformats.org/presentationml/2006/main" showMasterSp="0">
   <p:cSld>
     <p:spTree>
       <p:nvGrpSpPr>
@@ -4432,7 +4691,11 @@
           <a:lstStyle/>
           <a:p>
             <a:r>
-              <a:rPr lang="en-US" dirty="0"/>
+              <a:rPr lang="en-US" dirty="0">
+                <a:solidFill>
+                  <a:schemeClr val="bg1"/>
+                </a:solidFill>
+              </a:rPr>
               <a:t>Write Preference</a:t>
             </a:r>
           </a:p>
@@ -4555,7 +4818,7 @@
 </file>
 
 <file path=ppt/slides/slide9.xml><?xml version="1.0" encoding="utf-8"?>
-<p:sld xmlns:a="http://schemas.openxmlformats.org/drawingml/2006/main" xmlns:r="http://schemas.openxmlformats.org/officeDocument/2006/relationships" xmlns:p="http://schemas.openxmlformats.org/presentationml/2006/main">
+<p:sld xmlns:a="http://schemas.openxmlformats.org/drawingml/2006/main" xmlns:r="http://schemas.openxmlformats.org/officeDocument/2006/relationships" xmlns:p="http://schemas.openxmlformats.org/presentationml/2006/main" showMasterSp="0">
   <p:cSld>
     <p:spTree>
       <p:nvGrpSpPr>
@@ -4593,7 +4856,11 @@
           <a:lstStyle/>
           <a:p>
             <a:r>
-              <a:rPr lang="en-US" dirty="0"/>
+              <a:rPr lang="en-US" dirty="0">
+                <a:solidFill>
+                  <a:schemeClr val="bg1"/>
+                </a:solidFill>
+              </a:rPr>
               <a:t>Reading Preference</a:t>
             </a:r>
           </a:p>

</xml_diff>

<commit_message>
added apis to clear and remove preference
</commit_message>
<xml_diff>
--- a/DataStore.pptx
+++ b/DataStore.pptx
@@ -5,19 +5,19 @@
     <p:sldMasterId id="2147483648" r:id="rId1"/>
   </p:sldMasterIdLst>
   <p:sldIdLst>
-    <p:sldId id="256" r:id="rId2"/>
-    <p:sldId id="257" r:id="rId3"/>
-    <p:sldId id="258" r:id="rId4"/>
-    <p:sldId id="259" r:id="rId5"/>
-    <p:sldId id="260" r:id="rId6"/>
-    <p:sldId id="266" r:id="rId7"/>
-    <p:sldId id="268" r:id="rId8"/>
-    <p:sldId id="261" r:id="rId9"/>
-    <p:sldId id="262" r:id="rId10"/>
-    <p:sldId id="267" r:id="rId11"/>
-    <p:sldId id="263" r:id="rId12"/>
-    <p:sldId id="264" r:id="rId13"/>
-    <p:sldId id="265" r:id="rId14"/>
+    <p:sldId id="270" r:id="rId2"/>
+    <p:sldId id="271" r:id="rId3"/>
+    <p:sldId id="272" r:id="rId4"/>
+    <p:sldId id="273" r:id="rId5"/>
+    <p:sldId id="274" r:id="rId6"/>
+    <p:sldId id="275" r:id="rId7"/>
+    <p:sldId id="276" r:id="rId8"/>
+    <p:sldId id="277" r:id="rId9"/>
+    <p:sldId id="278" r:id="rId10"/>
+    <p:sldId id="281" r:id="rId11"/>
+    <p:sldId id="269" r:id="rId12"/>
+    <p:sldId id="280" r:id="rId13"/>
+    <p:sldId id="279" r:id="rId14"/>
   </p:sldIdLst>
   <p:sldSz cx="12192000" cy="6858000"/>
   <p:notesSz cx="6858000" cy="9144000"/>
@@ -3504,7 +3504,7 @@
 </file>
 
 <file path=ppt/slides/slide1.xml><?xml version="1.0" encoding="utf-8"?>
-<p:sld xmlns:a="http://schemas.openxmlformats.org/drawingml/2006/main" xmlns:r="http://schemas.openxmlformats.org/officeDocument/2006/relationships" xmlns:p="http://schemas.openxmlformats.org/presentationml/2006/main" showMasterSp="0">
+<p:sld xmlns:a="http://schemas.openxmlformats.org/drawingml/2006/main" xmlns:r="http://schemas.openxmlformats.org/officeDocument/2006/relationships" xmlns:p="http://schemas.openxmlformats.org/presentationml/2006/main">
   <p:cSld>
     <p:spTree>
       <p:nvGrpSpPr>
@@ -3522,30 +3522,52 @@
       </p:grpSpPr>
       <p:sp>
         <p:nvSpPr>
-          <p:cNvPr id="2" name="Title 1">
-            <a:extLst>
-              <a:ext uri="{FF2B5EF4-FFF2-40B4-BE49-F238E27FC236}">
-                <a16:creationId xmlns:a16="http://schemas.microsoft.com/office/drawing/2014/main" id="{583818F7-69B6-A34B-A68B-53BFCC752998}"/>
-              </a:ext>
-            </a:extLst>
-          </p:cNvPr>
-          <p:cNvSpPr>
-            <a:spLocks noGrp="1"/>
-          </p:cNvSpPr>
-          <p:nvPr>
-            <p:ph type="ctrTitle"/>
-          </p:nvPr>
+          <p:cNvPr id="4" name="Title 1">
+            <a:extLst>
+              <a:ext uri="{FF2B5EF4-FFF2-40B4-BE49-F238E27FC236}">
+                <a16:creationId xmlns:a16="http://schemas.microsoft.com/office/drawing/2014/main" id="{BD9573A6-6490-B84F-A978-3291E275F2F3}"/>
+              </a:ext>
+            </a:extLst>
+          </p:cNvPr>
+          <p:cNvSpPr txBox="1">
+            <a:spLocks/>
+          </p:cNvSpPr>
+          <p:nvPr/>
         </p:nvSpPr>
         <p:spPr>
           <a:xfrm>
             <a:off x="1524000" y="2913736"/>
             <a:ext cx="9144000" cy="1030528"/>
           </a:xfrm>
+          <a:prstGeom prst="rect">
+            <a:avLst/>
+          </a:prstGeom>
         </p:spPr>
         <p:txBody>
-          <a:bodyPr/>
-          <a:lstStyle/>
-          <a:p>
+          <a:bodyPr vert="horz" lIns="91440" tIns="45720" rIns="91440" bIns="45720" rtlCol="0" anchor="ctr">
+            <a:normAutofit/>
+          </a:bodyPr>
+          <a:lstStyle>
+            <a:lvl1pPr algn="l" defTabSz="914400" rtl="0" eaLnBrk="1" latinLnBrk="0" hangingPunct="1">
+              <a:lnSpc>
+                <a:spcPct val="90000"/>
+              </a:lnSpc>
+              <a:spcBef>
+                <a:spcPct val="0"/>
+              </a:spcBef>
+              <a:buNone/>
+              <a:defRPr sz="4400" kern="1200">
+                <a:solidFill>
+                  <a:schemeClr val="tx1"/>
+                </a:solidFill>
+                <a:latin typeface="+mj-lt"/>
+                <a:ea typeface="+mj-ea"/>
+                <a:cs typeface="+mj-cs"/>
+              </a:defRPr>
+            </a:lvl1pPr>
+          </a:lstStyle>
+          <a:p>
+            <a:pPr algn="ctr"/>
             <a:r>
               <a:rPr lang="en-US" dirty="0">
                 <a:solidFill>
@@ -3560,7 +3582,7 @@
     </p:spTree>
     <p:extLst>
       <p:ext uri="{BB962C8B-B14F-4D97-AF65-F5344CB8AC3E}">
-        <p14:creationId xmlns:p14="http://schemas.microsoft.com/office/powerpoint/2010/main" val="1210222999"/>
+        <p14:creationId xmlns:p14="http://schemas.microsoft.com/office/powerpoint/2010/main" val="1104972706"/>
       </p:ext>
     </p:extLst>
   </p:cSld>
@@ -3571,7 +3593,7 @@
 </file>
 
 <file path=ppt/slides/slide10.xml><?xml version="1.0" encoding="utf-8"?>
-<p:sld xmlns:a="http://schemas.openxmlformats.org/drawingml/2006/main" xmlns:r="http://schemas.openxmlformats.org/officeDocument/2006/relationships" xmlns:p="http://schemas.openxmlformats.org/presentationml/2006/main" showMasterSp="0">
+<p:sld xmlns:a="http://schemas.openxmlformats.org/drawingml/2006/main" xmlns:r="http://schemas.openxmlformats.org/officeDocument/2006/relationships" xmlns:p="http://schemas.openxmlformats.org/presentationml/2006/main">
   <p:cSld>
     <p:spTree>
       <p:nvGrpSpPr>
@@ -3592,7 +3614,7 @@
           <p:cNvPr id="2" name="Title 1">
             <a:extLst>
               <a:ext uri="{FF2B5EF4-FFF2-40B4-BE49-F238E27FC236}">
-                <a16:creationId xmlns:a16="http://schemas.microsoft.com/office/drawing/2014/main" id="{14C1C2CD-7B84-794C-BEE4-15893B735F11}"/>
+                <a16:creationId xmlns:a16="http://schemas.microsoft.com/office/drawing/2014/main" id="{938D63FD-EF6F-BE40-BD4E-7C0F7B222013}"/>
               </a:ext>
             </a:extLst>
           </p:cNvPr>
@@ -3604,6 +3626,280 @@
           </p:nvPr>
         </p:nvSpPr>
         <p:spPr/>
+        <p:txBody>
+          <a:bodyPr/>
+          <a:lstStyle/>
+          <a:p>
+            <a:r>
+              <a:rPr lang="en-US" dirty="0">
+                <a:solidFill>
+                  <a:schemeClr val="bg1"/>
+                </a:solidFill>
+              </a:rPr>
+              <a:t>Read Synchronously</a:t>
+            </a:r>
+          </a:p>
+        </p:txBody>
+      </p:sp>
+      <p:sp>
+        <p:nvSpPr>
+          <p:cNvPr id="3" name="Content Placeholder 2">
+            <a:extLst>
+              <a:ext uri="{FF2B5EF4-FFF2-40B4-BE49-F238E27FC236}">
+                <a16:creationId xmlns:a16="http://schemas.microsoft.com/office/drawing/2014/main" id="{7B679462-B877-1C47-967C-48150CF32BED}"/>
+              </a:ext>
+            </a:extLst>
+          </p:cNvPr>
+          <p:cNvSpPr>
+            <a:spLocks noGrp="1"/>
+          </p:cNvSpPr>
+          <p:nvPr>
+            <p:ph idx="1"/>
+          </p:nvPr>
+        </p:nvSpPr>
+        <p:spPr/>
+        <p:txBody>
+          <a:bodyPr/>
+          <a:lstStyle/>
+          <a:p>
+            <a:endParaRPr lang="en-US" dirty="0"/>
+          </a:p>
+        </p:txBody>
+      </p:sp>
+    </p:spTree>
+    <p:extLst>
+      <p:ext uri="{BB962C8B-B14F-4D97-AF65-F5344CB8AC3E}">
+        <p14:creationId xmlns:p14="http://schemas.microsoft.com/office/powerpoint/2010/main" val="3748099505"/>
+      </p:ext>
+    </p:extLst>
+  </p:cSld>
+  <p:clrMapOvr>
+    <a:masterClrMapping/>
+  </p:clrMapOvr>
+</p:sld>
+</file>
+
+<file path=ppt/slides/slide11.xml><?xml version="1.0" encoding="utf-8"?>
+<p:sld xmlns:a="http://schemas.openxmlformats.org/drawingml/2006/main" xmlns:r="http://schemas.openxmlformats.org/officeDocument/2006/relationships" xmlns:p="http://schemas.openxmlformats.org/presentationml/2006/main">
+  <p:cSld>
+    <p:spTree>
+      <p:nvGrpSpPr>
+        <p:cNvPr id="1" name=""/>
+        <p:cNvGrpSpPr/>
+        <p:nvPr/>
+      </p:nvGrpSpPr>
+      <p:grpSpPr>
+        <a:xfrm>
+          <a:off x="0" y="0"/>
+          <a:ext cx="0" cy="0"/>
+          <a:chOff x="0" y="0"/>
+          <a:chExt cx="0" cy="0"/>
+        </a:xfrm>
+      </p:grpSpPr>
+      <p:sp>
+        <p:nvSpPr>
+          <p:cNvPr id="2" name="Title 1">
+            <a:extLst>
+              <a:ext uri="{FF2B5EF4-FFF2-40B4-BE49-F238E27FC236}">
+                <a16:creationId xmlns:a16="http://schemas.microsoft.com/office/drawing/2014/main" id="{28E315A7-1529-FD4A-86B7-476DE3F6DB25}"/>
+              </a:ext>
+            </a:extLst>
+          </p:cNvPr>
+          <p:cNvSpPr>
+            <a:spLocks noGrp="1"/>
+          </p:cNvSpPr>
+          <p:nvPr>
+            <p:ph type="title"/>
+          </p:nvPr>
+        </p:nvSpPr>
+        <p:spPr/>
+        <p:txBody>
+          <a:bodyPr/>
+          <a:lstStyle/>
+          <a:p>
+            <a:r>
+              <a:rPr lang="en-US" dirty="0">
+                <a:solidFill>
+                  <a:schemeClr val="bg1"/>
+                </a:solidFill>
+              </a:rPr>
+              <a:t>Remove Preference</a:t>
+            </a:r>
+          </a:p>
+        </p:txBody>
+      </p:sp>
+      <p:pic>
+        <p:nvPicPr>
+          <p:cNvPr id="9" name="Content Placeholder 8" descr="Text&#10;&#10;Description automatically generated">
+            <a:extLst>
+              <a:ext uri="{FF2B5EF4-FFF2-40B4-BE49-F238E27FC236}">
+                <a16:creationId xmlns:a16="http://schemas.microsoft.com/office/drawing/2014/main" id="{B79D565F-F740-5745-8FB4-1E8EBD4CC768}"/>
+              </a:ext>
+            </a:extLst>
+          </p:cNvPr>
+          <p:cNvPicPr>
+            <a:picLocks noGrp="1" noChangeAspect="1"/>
+          </p:cNvPicPr>
+          <p:nvPr>
+            <p:ph idx="1"/>
+          </p:nvPr>
+        </p:nvPicPr>
+        <p:blipFill>
+          <a:blip r:embed="rId2"/>
+          <a:stretch>
+            <a:fillRect/>
+          </a:stretch>
+        </p:blipFill>
+        <p:spPr>
+          <a:xfrm>
+            <a:off x="838200" y="2113971"/>
+            <a:ext cx="8077200" cy="2044700"/>
+          </a:xfrm>
+        </p:spPr>
+      </p:pic>
+    </p:spTree>
+    <p:extLst>
+      <p:ext uri="{BB962C8B-B14F-4D97-AF65-F5344CB8AC3E}">
+        <p14:creationId xmlns:p14="http://schemas.microsoft.com/office/powerpoint/2010/main" val="2672578772"/>
+      </p:ext>
+    </p:extLst>
+  </p:cSld>
+  <p:clrMapOvr>
+    <a:masterClrMapping/>
+  </p:clrMapOvr>
+</p:sld>
+</file>
+
+<file path=ppt/slides/slide12.xml><?xml version="1.0" encoding="utf-8"?>
+<p:sld xmlns:a="http://schemas.openxmlformats.org/drawingml/2006/main" xmlns:r="http://schemas.openxmlformats.org/officeDocument/2006/relationships" xmlns:p="http://schemas.openxmlformats.org/presentationml/2006/main">
+  <p:cSld>
+    <p:spTree>
+      <p:nvGrpSpPr>
+        <p:cNvPr id="1" name=""/>
+        <p:cNvGrpSpPr/>
+        <p:nvPr/>
+      </p:nvGrpSpPr>
+      <p:grpSpPr>
+        <a:xfrm>
+          <a:off x="0" y="0"/>
+          <a:ext cx="0" cy="0"/>
+          <a:chOff x="0" y="0"/>
+          <a:chExt cx="0" cy="0"/>
+        </a:xfrm>
+      </p:grpSpPr>
+      <p:sp>
+        <p:nvSpPr>
+          <p:cNvPr id="2" name="Title 1">
+            <a:extLst>
+              <a:ext uri="{FF2B5EF4-FFF2-40B4-BE49-F238E27FC236}">
+                <a16:creationId xmlns:a16="http://schemas.microsoft.com/office/drawing/2014/main" id="{27F6824D-B776-5E4C-BF54-D8809819290E}"/>
+              </a:ext>
+            </a:extLst>
+          </p:cNvPr>
+          <p:cNvSpPr>
+            <a:spLocks noGrp="1"/>
+          </p:cNvSpPr>
+          <p:nvPr>
+            <p:ph type="title"/>
+          </p:nvPr>
+        </p:nvSpPr>
+        <p:spPr/>
+        <p:txBody>
+          <a:bodyPr/>
+          <a:lstStyle/>
+          <a:p>
+            <a:r>
+              <a:rPr lang="en-US" dirty="0">
+                <a:solidFill>
+                  <a:schemeClr val="bg1"/>
+                </a:solidFill>
+              </a:rPr>
+              <a:t>Clear Preference</a:t>
+            </a:r>
+          </a:p>
+        </p:txBody>
+      </p:sp>
+      <p:pic>
+        <p:nvPicPr>
+          <p:cNvPr id="9" name="Content Placeholder 8" descr="Text&#10;&#10;Description automatically generated">
+            <a:extLst>
+              <a:ext uri="{FF2B5EF4-FFF2-40B4-BE49-F238E27FC236}">
+                <a16:creationId xmlns:a16="http://schemas.microsoft.com/office/drawing/2014/main" id="{4FEBC8F5-C6B0-D745-BB5F-8D7ABAD8645A}"/>
+              </a:ext>
+            </a:extLst>
+          </p:cNvPr>
+          <p:cNvPicPr>
+            <a:picLocks noGrp="1" noChangeAspect="1"/>
+          </p:cNvPicPr>
+          <p:nvPr>
+            <p:ph idx="1"/>
+          </p:nvPr>
+        </p:nvPicPr>
+        <p:blipFill>
+          <a:blip r:embed="rId2"/>
+          <a:stretch>
+            <a:fillRect/>
+          </a:stretch>
+        </p:blipFill>
+        <p:spPr>
+          <a:xfrm>
+            <a:off x="838200" y="2131133"/>
+            <a:ext cx="7632700" cy="1689100"/>
+          </a:xfrm>
+        </p:spPr>
+      </p:pic>
+    </p:spTree>
+    <p:extLst>
+      <p:ext uri="{BB962C8B-B14F-4D97-AF65-F5344CB8AC3E}">
+        <p14:creationId xmlns:p14="http://schemas.microsoft.com/office/powerpoint/2010/main" val="3704248862"/>
+      </p:ext>
+    </p:extLst>
+  </p:cSld>
+  <p:clrMapOvr>
+    <a:masterClrMapping/>
+  </p:clrMapOvr>
+</p:sld>
+</file>
+
+<file path=ppt/slides/slide13.xml><?xml version="1.0" encoding="utf-8"?>
+<p:sld xmlns:a="http://schemas.openxmlformats.org/drawingml/2006/main" xmlns:r="http://schemas.openxmlformats.org/officeDocument/2006/relationships" xmlns:p="http://schemas.openxmlformats.org/presentationml/2006/main">
+  <p:cSld>
+    <p:spTree>
+      <p:nvGrpSpPr>
+        <p:cNvPr id="1" name=""/>
+        <p:cNvGrpSpPr/>
+        <p:nvPr/>
+      </p:nvGrpSpPr>
+      <p:grpSpPr>
+        <a:xfrm>
+          <a:off x="0" y="0"/>
+          <a:ext cx="0" cy="0"/>
+          <a:chOff x="0" y="0"/>
+          <a:chExt cx="0" cy="0"/>
+        </a:xfrm>
+      </p:grpSpPr>
+      <p:sp>
+        <p:nvSpPr>
+          <p:cNvPr id="4" name="Title 1">
+            <a:extLst>
+              <a:ext uri="{FF2B5EF4-FFF2-40B4-BE49-F238E27FC236}">
+                <a16:creationId xmlns:a16="http://schemas.microsoft.com/office/drawing/2014/main" id="{919A63AA-4550-2E4B-93FD-114238B93E34}"/>
+              </a:ext>
+            </a:extLst>
+          </p:cNvPr>
+          <p:cNvSpPr>
+            <a:spLocks noGrp="1"/>
+          </p:cNvSpPr>
+          <p:nvPr>
+            <p:ph type="title"/>
+          </p:nvPr>
+        </p:nvSpPr>
+        <p:spPr>
+          <a:xfrm>
+            <a:off x="838200" y="365125"/>
+            <a:ext cx="10515600" cy="1325563"/>
+          </a:xfrm>
+        </p:spPr>
         <p:txBody>
           <a:bodyPr/>
           <a:lstStyle/>
@@ -3621,10 +3917,10 @@
       </p:sp>
       <p:pic>
         <p:nvPicPr>
-          <p:cNvPr id="4" name="Content Placeholder 3" descr="Graphical user interface, text, application&#10;&#10;Description automatically generated">
-            <a:extLst>
-              <a:ext uri="{FF2B5EF4-FFF2-40B4-BE49-F238E27FC236}">
-                <a16:creationId xmlns:a16="http://schemas.microsoft.com/office/drawing/2014/main" id="{D1796B06-A797-C247-8AEA-7D9A8052CF76}"/>
+          <p:cNvPr id="5" name="Content Placeholder 3" descr="Graphical user interface, text, application&#10;&#10;Description automatically generated">
+            <a:extLst>
+              <a:ext uri="{FF2B5EF4-FFF2-40B4-BE49-F238E27FC236}">
+                <a16:creationId xmlns:a16="http://schemas.microsoft.com/office/drawing/2014/main" id="{261D6576-CD7E-3949-A05F-89984D050670}"/>
               </a:ext>
             </a:extLst>
           </p:cNvPr>
@@ -3654,7 +3950,7 @@
     </p:spTree>
     <p:extLst>
       <p:ext uri="{BB962C8B-B14F-4D97-AF65-F5344CB8AC3E}">
-        <p14:creationId xmlns:p14="http://schemas.microsoft.com/office/powerpoint/2010/main" val="2641571486"/>
+        <p14:creationId xmlns:p14="http://schemas.microsoft.com/office/powerpoint/2010/main" val="3007791179"/>
       </p:ext>
     </p:extLst>
   </p:cSld>
@@ -3664,8 +3960,8 @@
 </p:sld>
 </file>
 
-<file path=ppt/slides/slide11.xml><?xml version="1.0" encoding="utf-8"?>
-<p:sld xmlns:a="http://schemas.openxmlformats.org/drawingml/2006/main" xmlns:r="http://schemas.openxmlformats.org/officeDocument/2006/relationships" xmlns:p="http://schemas.openxmlformats.org/presentationml/2006/main" showMasterSp="0">
+<file path=ppt/slides/slide2.xml><?xml version="1.0" encoding="utf-8"?>
+<p:sld xmlns:a="http://schemas.openxmlformats.org/drawingml/2006/main" xmlns:r="http://schemas.openxmlformats.org/officeDocument/2006/relationships" xmlns:p="http://schemas.openxmlformats.org/presentationml/2006/main">
   <p:cSld>
     <p:spTree>
       <p:nvGrpSpPr>
@@ -3683,31 +3979,70 @@
       </p:grpSpPr>
       <p:sp>
         <p:nvSpPr>
-          <p:cNvPr id="2" name="Title 1">
-            <a:extLst>
-              <a:ext uri="{FF2B5EF4-FFF2-40B4-BE49-F238E27FC236}">
-                <a16:creationId xmlns:a16="http://schemas.microsoft.com/office/drawing/2014/main" id="{59BE37D6-92C7-FC4B-8C71-0418BCAED9C0}"/>
-              </a:ext>
-            </a:extLst>
-          </p:cNvPr>
-          <p:cNvSpPr>
-            <a:spLocks noGrp="1"/>
-          </p:cNvSpPr>
-          <p:nvPr>
-            <p:ph type="title"/>
+          <p:cNvPr id="4" name="Content Placeholder 2">
+            <a:extLst>
+              <a:ext uri="{FF2B5EF4-FFF2-40B4-BE49-F238E27FC236}">
+                <a16:creationId xmlns:a16="http://schemas.microsoft.com/office/drawing/2014/main" id="{CE2EA693-9698-DA4D-850A-20F07DD15FF7}"/>
+              </a:ext>
+            </a:extLst>
+          </p:cNvPr>
+          <p:cNvSpPr>
+            <a:spLocks noGrp="1"/>
+          </p:cNvSpPr>
+          <p:nvPr>
+            <p:ph idx="1"/>
           </p:nvPr>
         </p:nvSpPr>
         <p:spPr>
           <a:xfrm>
-            <a:off x="838200" y="2766218"/>
-            <a:ext cx="10515600" cy="1325563"/>
+            <a:off x="421512" y="332490"/>
+            <a:ext cx="10515600" cy="4351338"/>
           </a:xfrm>
         </p:spPr>
         <p:txBody>
           <a:bodyPr/>
           <a:lstStyle/>
           <a:p>
-            <a:pPr algn="ctr"/>
+            <a:r>
+              <a:rPr lang="en-US" dirty="0">
+                <a:solidFill>
+                  <a:schemeClr val="bg1"/>
+                </a:solidFill>
+              </a:rPr>
+              <a:t>Basics</a:t>
+            </a:r>
+          </a:p>
+          <a:p>
+            <a:r>
+              <a:rPr lang="en-US" dirty="0">
+                <a:solidFill>
+                  <a:schemeClr val="bg1"/>
+                </a:solidFill>
+              </a:rPr>
+              <a:t>Why to migrate?</a:t>
+            </a:r>
+          </a:p>
+          <a:p>
+            <a:r>
+              <a:rPr lang="en-US" dirty="0">
+                <a:solidFill>
+                  <a:schemeClr val="bg1"/>
+                </a:solidFill>
+              </a:rPr>
+              <a:t>Setup</a:t>
+            </a:r>
+          </a:p>
+          <a:p>
+            <a:r>
+              <a:rPr lang="en-US" dirty="0">
+                <a:solidFill>
+                  <a:schemeClr val="bg1"/>
+                </a:solidFill>
+              </a:rPr>
+              <a:t>Read/write</a:t>
+            </a:r>
+          </a:p>
+          <a:p>
             <a:r>
               <a:rPr lang="en-US" dirty="0">
                 <a:solidFill>
@@ -3717,12 +4052,22 @@
               <a:t>Demo</a:t>
             </a:r>
           </a:p>
+          <a:p>
+            <a:r>
+              <a:rPr lang="en-US" dirty="0">
+                <a:solidFill>
+                  <a:schemeClr val="bg1"/>
+                </a:solidFill>
+              </a:rPr>
+              <a:t>Questions?</a:t>
+            </a:r>
+          </a:p>
         </p:txBody>
       </p:sp>
     </p:spTree>
     <p:extLst>
       <p:ext uri="{BB962C8B-B14F-4D97-AF65-F5344CB8AC3E}">
-        <p14:creationId xmlns:p14="http://schemas.microsoft.com/office/powerpoint/2010/main" val="3423347409"/>
+        <p14:creationId xmlns:p14="http://schemas.microsoft.com/office/powerpoint/2010/main" val="3535209730"/>
       </p:ext>
     </p:extLst>
   </p:cSld>
@@ -3732,8 +4077,8 @@
 </p:sld>
 </file>
 
-<file path=ppt/slides/slide12.xml><?xml version="1.0" encoding="utf-8"?>
-<p:sld xmlns:a="http://schemas.openxmlformats.org/drawingml/2006/main" xmlns:r="http://schemas.openxmlformats.org/officeDocument/2006/relationships" xmlns:p="http://schemas.openxmlformats.org/presentationml/2006/main" showMasterSp="0">
+<file path=ppt/slides/slide3.xml><?xml version="1.0" encoding="utf-8"?>
+<p:sld xmlns:a="http://schemas.openxmlformats.org/drawingml/2006/main" xmlns:r="http://schemas.openxmlformats.org/officeDocument/2006/relationships" xmlns:p="http://schemas.openxmlformats.org/presentationml/2006/main">
   <p:cSld>
     <p:spTree>
       <p:nvGrpSpPr>
@@ -3751,10 +4096,10 @@
       </p:grpSpPr>
       <p:sp>
         <p:nvSpPr>
-          <p:cNvPr id="2" name="Title 1">
-            <a:extLst>
-              <a:ext uri="{FF2B5EF4-FFF2-40B4-BE49-F238E27FC236}">
-                <a16:creationId xmlns:a16="http://schemas.microsoft.com/office/drawing/2014/main" id="{4576B776-6CFC-304C-95F3-56984D283CEA}"/>
+          <p:cNvPr id="4" name="Title 1">
+            <a:extLst>
+              <a:ext uri="{FF2B5EF4-FFF2-40B4-BE49-F238E27FC236}">
+                <a16:creationId xmlns:a16="http://schemas.microsoft.com/office/drawing/2014/main" id="{E42783BA-27A3-F54A-B1AC-5B359F65C768}"/>
               </a:ext>
             </a:extLst>
           </p:cNvPr>
@@ -3767,7 +4112,7 @@
         </p:nvSpPr>
         <p:spPr>
           <a:xfrm>
-            <a:off x="838200" y="2766218"/>
+            <a:off x="838200" y="365125"/>
             <a:ext cx="10515600" cy="1325563"/>
           </a:xfrm>
         </p:spPr>
@@ -3775,22 +4120,127 @@
           <a:bodyPr/>
           <a:lstStyle/>
           <a:p>
-            <a:pPr algn="ctr"/>
             <a:r>
               <a:rPr lang="en-US" dirty="0">
                 <a:solidFill>
                   <a:schemeClr val="bg1"/>
                 </a:solidFill>
               </a:rPr>
-              <a:t>Questions?</a:t>
-            </a:r>
+              <a:t>Data Store</a:t>
+            </a:r>
+          </a:p>
+        </p:txBody>
+      </p:sp>
+      <p:sp>
+        <p:nvSpPr>
+          <p:cNvPr id="5" name="Content Placeholder 2">
+            <a:extLst>
+              <a:ext uri="{FF2B5EF4-FFF2-40B4-BE49-F238E27FC236}">
+                <a16:creationId xmlns:a16="http://schemas.microsoft.com/office/drawing/2014/main" id="{B4D71549-6BD3-1C40-9378-6939E763F19E}"/>
+              </a:ext>
+            </a:extLst>
+          </p:cNvPr>
+          <p:cNvSpPr>
+            <a:spLocks noGrp="1"/>
+          </p:cNvSpPr>
+          <p:nvPr>
+            <p:ph idx="1"/>
+          </p:nvPr>
+        </p:nvSpPr>
+        <p:spPr>
+          <a:xfrm>
+            <a:off x="838200" y="1825625"/>
+            <a:ext cx="10515600" cy="4351338"/>
+          </a:xfrm>
+        </p:spPr>
+        <p:txBody>
+          <a:bodyPr>
+            <a:normAutofit/>
+          </a:bodyPr>
+          <a:lstStyle/>
+          <a:p>
+            <a:r>
+              <a:rPr lang="en-IN" dirty="0">
+                <a:solidFill>
+                  <a:schemeClr val="bg1"/>
+                </a:solidFill>
+              </a:rPr>
+              <a:t>Latest way to store preference/typed objects</a:t>
+            </a:r>
+            <a:br>
+              <a:rPr lang="en-IN" dirty="0">
+                <a:solidFill>
+                  <a:schemeClr val="bg1"/>
+                </a:solidFill>
+              </a:rPr>
+            </a:br>
+            <a:r>
+              <a:rPr lang="en-IN" dirty="0">
+                <a:solidFill>
+                  <a:schemeClr val="bg1"/>
+                </a:solidFill>
+              </a:rPr>
+              <a:t>-Its a data storage solution that allows you to store key-value pairs or typed objects</a:t>
+            </a:r>
+          </a:p>
+          <a:p>
+            <a:pPr marL="0" indent="0">
+              <a:buNone/>
+            </a:pPr>
+            <a:endParaRPr lang="en-IN" dirty="0">
+              <a:solidFill>
+                <a:schemeClr val="bg1"/>
+              </a:solidFill>
+            </a:endParaRPr>
+          </a:p>
+          <a:p>
+            <a:r>
+              <a:rPr lang="en-IN" dirty="0">
+                <a:solidFill>
+                  <a:schemeClr val="bg1"/>
+                </a:solidFill>
+              </a:rPr>
+              <a:t>Its not a Database.</a:t>
+            </a:r>
+            <a:br>
+              <a:rPr lang="en-IN" dirty="0">
+                <a:solidFill>
+                  <a:schemeClr val="bg1"/>
+                </a:solidFill>
+              </a:rPr>
+            </a:br>
+            <a:r>
+              <a:rPr lang="en-IN" dirty="0">
+                <a:solidFill>
+                  <a:schemeClr val="bg1"/>
+                </a:solidFill>
+              </a:rPr>
+              <a:t>- Ideal for small, simple datasets and does not support partial updates or referential integrity</a:t>
+            </a:r>
+          </a:p>
+          <a:p>
+            <a:pPr marL="457200" lvl="1" indent="0">
+              <a:buNone/>
+            </a:pPr>
+            <a:br>
+              <a:rPr lang="en-US" dirty="0">
+                <a:solidFill>
+                  <a:schemeClr val="bg1"/>
+                </a:solidFill>
+              </a:rPr>
+            </a:br>
+            <a:endParaRPr lang="en-US" dirty="0">
+              <a:solidFill>
+                <a:schemeClr val="bg1"/>
+              </a:solidFill>
+            </a:endParaRPr>
           </a:p>
         </p:txBody>
       </p:sp>
     </p:spTree>
     <p:extLst>
       <p:ext uri="{BB962C8B-B14F-4D97-AF65-F5344CB8AC3E}">
-        <p14:creationId xmlns:p14="http://schemas.microsoft.com/office/powerpoint/2010/main" val="2149673806"/>
+        <p14:creationId xmlns:p14="http://schemas.microsoft.com/office/powerpoint/2010/main" val="1838831748"/>
       </p:ext>
     </p:extLst>
   </p:cSld>
@@ -3800,8 +4250,8 @@
 </p:sld>
 </file>
 
-<file path=ppt/slides/slide13.xml><?xml version="1.0" encoding="utf-8"?>
-<p:sld xmlns:a="http://schemas.openxmlformats.org/drawingml/2006/main" xmlns:r="http://schemas.openxmlformats.org/officeDocument/2006/relationships" xmlns:p="http://schemas.openxmlformats.org/presentationml/2006/main" showMasterSp="0">
+<file path=ppt/slides/slide4.xml><?xml version="1.0" encoding="utf-8"?>
+<p:sld xmlns:a="http://schemas.openxmlformats.org/drawingml/2006/main" xmlns:r="http://schemas.openxmlformats.org/officeDocument/2006/relationships" xmlns:p="http://schemas.openxmlformats.org/presentationml/2006/main">
   <p:cSld>
     <p:spTree>
       <p:nvGrpSpPr>
@@ -3819,358 +4269,10 @@
       </p:grpSpPr>
       <p:sp>
         <p:nvSpPr>
-          <p:cNvPr id="2" name="Title 1">
-            <a:extLst>
-              <a:ext uri="{FF2B5EF4-FFF2-40B4-BE49-F238E27FC236}">
-                <a16:creationId xmlns:a16="http://schemas.microsoft.com/office/drawing/2014/main" id="{F86059A6-12B3-D243-BD3E-7F9EB6780670}"/>
-              </a:ext>
-            </a:extLst>
-          </p:cNvPr>
-          <p:cNvSpPr>
-            <a:spLocks noGrp="1"/>
-          </p:cNvSpPr>
-          <p:nvPr>
-            <p:ph type="title"/>
-          </p:nvPr>
-        </p:nvSpPr>
-        <p:spPr>
-          <a:xfrm>
-            <a:off x="838200" y="2766218"/>
-            <a:ext cx="10515600" cy="1325563"/>
-          </a:xfrm>
-        </p:spPr>
-        <p:txBody>
-          <a:bodyPr/>
-          <a:lstStyle/>
-          <a:p>
-            <a:pPr algn="ctr"/>
-            <a:r>
-              <a:rPr lang="en-US" dirty="0">
-                <a:solidFill>
-                  <a:schemeClr val="bg1"/>
-                </a:solidFill>
-              </a:rPr>
-              <a:t>Thank you!</a:t>
-            </a:r>
-          </a:p>
-        </p:txBody>
-      </p:sp>
-    </p:spTree>
-    <p:extLst>
-      <p:ext uri="{BB962C8B-B14F-4D97-AF65-F5344CB8AC3E}">
-        <p14:creationId xmlns:p14="http://schemas.microsoft.com/office/powerpoint/2010/main" val="2977985380"/>
-      </p:ext>
-    </p:extLst>
-  </p:cSld>
-  <p:clrMapOvr>
-    <a:masterClrMapping/>
-  </p:clrMapOvr>
-</p:sld>
-</file>
-
-<file path=ppt/slides/slide2.xml><?xml version="1.0" encoding="utf-8"?>
-<p:sld xmlns:a="http://schemas.openxmlformats.org/drawingml/2006/main" xmlns:r="http://schemas.openxmlformats.org/officeDocument/2006/relationships" xmlns:p="http://schemas.openxmlformats.org/presentationml/2006/main" showMasterSp="0">
-  <p:cSld>
-    <p:spTree>
-      <p:nvGrpSpPr>
-        <p:cNvPr id="1" name=""/>
-        <p:cNvGrpSpPr/>
-        <p:nvPr/>
-      </p:nvGrpSpPr>
-      <p:grpSpPr>
-        <a:xfrm>
-          <a:off x="0" y="0"/>
-          <a:ext cx="0" cy="0"/>
-          <a:chOff x="0" y="0"/>
-          <a:chExt cx="0" cy="0"/>
-        </a:xfrm>
-      </p:grpSpPr>
-      <p:sp>
-        <p:nvSpPr>
-          <p:cNvPr id="3" name="Content Placeholder 2">
-            <a:extLst>
-              <a:ext uri="{FF2B5EF4-FFF2-40B4-BE49-F238E27FC236}">
-                <a16:creationId xmlns:a16="http://schemas.microsoft.com/office/drawing/2014/main" id="{01114A97-FF89-A141-81D9-F089953D5E44}"/>
-              </a:ext>
-            </a:extLst>
-          </p:cNvPr>
-          <p:cNvSpPr>
-            <a:spLocks noGrp="1"/>
-          </p:cNvSpPr>
-          <p:nvPr>
-            <p:ph idx="1"/>
-          </p:nvPr>
-        </p:nvSpPr>
-        <p:spPr>
-          <a:xfrm>
-            <a:off x="421512" y="332490"/>
-            <a:ext cx="10515600" cy="4351338"/>
-          </a:xfrm>
-        </p:spPr>
-        <p:txBody>
-          <a:bodyPr/>
-          <a:lstStyle/>
-          <a:p>
-            <a:r>
-              <a:rPr lang="en-US" dirty="0">
-                <a:solidFill>
-                  <a:schemeClr val="bg1"/>
-                </a:solidFill>
-              </a:rPr>
-              <a:t>Basics</a:t>
-            </a:r>
-          </a:p>
-          <a:p>
-            <a:r>
-              <a:rPr lang="en-US" dirty="0">
-                <a:solidFill>
-                  <a:schemeClr val="bg1"/>
-                </a:solidFill>
-              </a:rPr>
-              <a:t>Why to migrate?</a:t>
-            </a:r>
-          </a:p>
-          <a:p>
-            <a:r>
-              <a:rPr lang="en-US" dirty="0">
-                <a:solidFill>
-                  <a:schemeClr val="bg1"/>
-                </a:solidFill>
-              </a:rPr>
-              <a:t>Setup</a:t>
-            </a:r>
-          </a:p>
-          <a:p>
-            <a:r>
-              <a:rPr lang="en-US" dirty="0">
-                <a:solidFill>
-                  <a:schemeClr val="bg1"/>
-                </a:solidFill>
-              </a:rPr>
-              <a:t>Read/write</a:t>
-            </a:r>
-          </a:p>
-          <a:p>
-            <a:r>
-              <a:rPr lang="en-US" dirty="0">
-                <a:solidFill>
-                  <a:schemeClr val="bg1"/>
-                </a:solidFill>
-              </a:rPr>
-              <a:t>Demo</a:t>
-            </a:r>
-          </a:p>
-          <a:p>
-            <a:r>
-              <a:rPr lang="en-US" dirty="0">
-                <a:solidFill>
-                  <a:schemeClr val="bg1"/>
-                </a:solidFill>
-              </a:rPr>
-              <a:t>Questions?</a:t>
-            </a:r>
-          </a:p>
-        </p:txBody>
-      </p:sp>
-    </p:spTree>
-    <p:extLst>
-      <p:ext uri="{BB962C8B-B14F-4D97-AF65-F5344CB8AC3E}">
-        <p14:creationId xmlns:p14="http://schemas.microsoft.com/office/powerpoint/2010/main" val="3224420675"/>
-      </p:ext>
-    </p:extLst>
-  </p:cSld>
-  <p:clrMapOvr>
-    <a:masterClrMapping/>
-  </p:clrMapOvr>
-</p:sld>
-</file>
-
-<file path=ppt/slides/slide3.xml><?xml version="1.0" encoding="utf-8"?>
-<p:sld xmlns:a="http://schemas.openxmlformats.org/drawingml/2006/main" xmlns:r="http://schemas.openxmlformats.org/officeDocument/2006/relationships" xmlns:p="http://schemas.openxmlformats.org/presentationml/2006/main" showMasterSp="0">
-  <p:cSld>
-    <p:spTree>
-      <p:nvGrpSpPr>
-        <p:cNvPr id="1" name=""/>
-        <p:cNvGrpSpPr/>
-        <p:nvPr/>
-      </p:nvGrpSpPr>
-      <p:grpSpPr>
-        <a:xfrm>
-          <a:off x="0" y="0"/>
-          <a:ext cx="0" cy="0"/>
-          <a:chOff x="0" y="0"/>
-          <a:chExt cx="0" cy="0"/>
-        </a:xfrm>
-      </p:grpSpPr>
-      <p:sp>
-        <p:nvSpPr>
-          <p:cNvPr id="2" name="Title 1">
-            <a:extLst>
-              <a:ext uri="{FF2B5EF4-FFF2-40B4-BE49-F238E27FC236}">
-                <a16:creationId xmlns:a16="http://schemas.microsoft.com/office/drawing/2014/main" id="{C51F5B10-A70C-314A-90C6-E17537738455}"/>
-              </a:ext>
-            </a:extLst>
-          </p:cNvPr>
-          <p:cNvSpPr>
-            <a:spLocks noGrp="1"/>
-          </p:cNvSpPr>
-          <p:nvPr>
-            <p:ph type="title"/>
-          </p:nvPr>
-        </p:nvSpPr>
-        <p:spPr/>
-        <p:txBody>
-          <a:bodyPr/>
-          <a:lstStyle/>
-          <a:p>
-            <a:r>
-              <a:rPr lang="en-US" dirty="0">
-                <a:solidFill>
-                  <a:schemeClr val="bg1"/>
-                </a:solidFill>
-              </a:rPr>
-              <a:t>Data Store</a:t>
-            </a:r>
-          </a:p>
-        </p:txBody>
-      </p:sp>
-      <p:sp>
-        <p:nvSpPr>
-          <p:cNvPr id="3" name="Content Placeholder 2">
-            <a:extLst>
-              <a:ext uri="{FF2B5EF4-FFF2-40B4-BE49-F238E27FC236}">
-                <a16:creationId xmlns:a16="http://schemas.microsoft.com/office/drawing/2014/main" id="{CD9D8270-D95E-D74A-968B-81938AA39DF7}"/>
-              </a:ext>
-            </a:extLst>
-          </p:cNvPr>
-          <p:cNvSpPr>
-            <a:spLocks noGrp="1"/>
-          </p:cNvSpPr>
-          <p:nvPr>
-            <p:ph idx="1"/>
-          </p:nvPr>
-        </p:nvSpPr>
-        <p:spPr/>
-        <p:txBody>
-          <a:bodyPr>
-            <a:normAutofit/>
-          </a:bodyPr>
-          <a:lstStyle/>
-          <a:p>
-            <a:r>
-              <a:rPr lang="en-IN" dirty="0">
-                <a:solidFill>
-                  <a:schemeClr val="bg1"/>
-                </a:solidFill>
-              </a:rPr>
-              <a:t>Latest way to store preference/typed objects</a:t>
-            </a:r>
-            <a:br>
-              <a:rPr lang="en-IN" dirty="0">
-                <a:solidFill>
-                  <a:schemeClr val="bg1"/>
-                </a:solidFill>
-              </a:rPr>
-            </a:br>
-            <a:r>
-              <a:rPr lang="en-IN" dirty="0">
-                <a:solidFill>
-                  <a:schemeClr val="bg1"/>
-                </a:solidFill>
-              </a:rPr>
-              <a:t>-Its a data storage solution that allows you to store key-value pairs or typed objects</a:t>
-            </a:r>
-          </a:p>
-          <a:p>
-            <a:pPr marL="0" indent="0">
-              <a:buNone/>
-            </a:pPr>
-            <a:endParaRPr lang="en-IN" dirty="0">
-              <a:solidFill>
-                <a:schemeClr val="bg1"/>
-              </a:solidFill>
-            </a:endParaRPr>
-          </a:p>
-          <a:p>
-            <a:r>
-              <a:rPr lang="en-IN" dirty="0">
-                <a:solidFill>
-                  <a:schemeClr val="bg1"/>
-                </a:solidFill>
-              </a:rPr>
-              <a:t>Its not a Database.</a:t>
-            </a:r>
-            <a:br>
-              <a:rPr lang="en-IN" dirty="0">
-                <a:solidFill>
-                  <a:schemeClr val="bg1"/>
-                </a:solidFill>
-              </a:rPr>
-            </a:br>
-            <a:r>
-              <a:rPr lang="en-IN" dirty="0">
-                <a:solidFill>
-                  <a:schemeClr val="bg1"/>
-                </a:solidFill>
-              </a:rPr>
-              <a:t>- Ideal for small, simple datasets and does not support partial updates or referential integrity</a:t>
-            </a:r>
-          </a:p>
-          <a:p>
-            <a:pPr marL="457200" lvl="1" indent="0">
-              <a:buNone/>
-            </a:pPr>
-            <a:br>
-              <a:rPr lang="en-US" dirty="0">
-                <a:solidFill>
-                  <a:schemeClr val="bg1"/>
-                </a:solidFill>
-              </a:rPr>
-            </a:br>
-            <a:endParaRPr lang="en-US" dirty="0">
-              <a:solidFill>
-                <a:schemeClr val="bg1"/>
-              </a:solidFill>
-            </a:endParaRPr>
-          </a:p>
-        </p:txBody>
-      </p:sp>
-    </p:spTree>
-    <p:extLst>
-      <p:ext uri="{BB962C8B-B14F-4D97-AF65-F5344CB8AC3E}">
-        <p14:creationId xmlns:p14="http://schemas.microsoft.com/office/powerpoint/2010/main" val="4096550076"/>
-      </p:ext>
-    </p:extLst>
-  </p:cSld>
-  <p:clrMapOvr>
-    <a:masterClrMapping/>
-  </p:clrMapOvr>
-</p:sld>
-</file>
-
-<file path=ppt/slides/slide4.xml><?xml version="1.0" encoding="utf-8"?>
-<p:sld xmlns:a="http://schemas.openxmlformats.org/drawingml/2006/main" xmlns:r="http://schemas.openxmlformats.org/officeDocument/2006/relationships" xmlns:p="http://schemas.openxmlformats.org/presentationml/2006/main" showMasterSp="0">
-  <p:cSld>
-    <p:spTree>
-      <p:nvGrpSpPr>
-        <p:cNvPr id="1" name=""/>
-        <p:cNvGrpSpPr/>
-        <p:nvPr/>
-      </p:nvGrpSpPr>
-      <p:grpSpPr>
-        <a:xfrm>
-          <a:off x="0" y="0"/>
-          <a:ext cx="0" cy="0"/>
-          <a:chOff x="0" y="0"/>
-          <a:chExt cx="0" cy="0"/>
-        </a:xfrm>
-      </p:grpSpPr>
-      <p:sp>
-        <p:nvSpPr>
-          <p:cNvPr id="2" name="Title 1">
-            <a:extLst>
-              <a:ext uri="{FF2B5EF4-FFF2-40B4-BE49-F238E27FC236}">
-                <a16:creationId xmlns:a16="http://schemas.microsoft.com/office/drawing/2014/main" id="{D3B06238-F136-774E-A779-76DCA6D70261}"/>
+          <p:cNvPr id="4" name="Title 1">
+            <a:extLst>
+              <a:ext uri="{FF2B5EF4-FFF2-40B4-BE49-F238E27FC236}">
+                <a16:creationId xmlns:a16="http://schemas.microsoft.com/office/drawing/2014/main" id="{A8A74D02-0748-254E-8729-03CDA984399C}"/>
               </a:ext>
             </a:extLst>
           </p:cNvPr>
@@ -4212,7 +4314,7 @@
           <p:cNvPr id="5" name="Content Placeholder 4" descr="Table&#10;&#10;Description automatically generated">
             <a:extLst>
               <a:ext uri="{FF2B5EF4-FFF2-40B4-BE49-F238E27FC236}">
-                <a16:creationId xmlns:a16="http://schemas.microsoft.com/office/drawing/2014/main" id="{A7941B29-74E8-DE4B-8467-9C4142E1B99B}"/>
+                <a16:creationId xmlns:a16="http://schemas.microsoft.com/office/drawing/2014/main" id="{E235924C-D46B-B049-AE18-ADB15A6C153F}"/>
               </a:ext>
             </a:extLst>
           </p:cNvPr>
@@ -4242,7 +4344,7 @@
     </p:spTree>
     <p:extLst>
       <p:ext uri="{BB962C8B-B14F-4D97-AF65-F5344CB8AC3E}">
-        <p14:creationId xmlns:p14="http://schemas.microsoft.com/office/powerpoint/2010/main" val="3982655976"/>
+        <p14:creationId xmlns:p14="http://schemas.microsoft.com/office/powerpoint/2010/main" val="307527391"/>
       </p:ext>
     </p:extLst>
   </p:cSld>
@@ -4253,7 +4355,7 @@
 </file>
 
 <file path=ppt/slides/slide5.xml><?xml version="1.0" encoding="utf-8"?>
-<p:sld xmlns:a="http://schemas.openxmlformats.org/drawingml/2006/main" xmlns:r="http://schemas.openxmlformats.org/officeDocument/2006/relationships" xmlns:p="http://schemas.openxmlformats.org/presentationml/2006/main" showMasterSp="0">
+<p:sld xmlns:a="http://schemas.openxmlformats.org/drawingml/2006/main" xmlns:r="http://schemas.openxmlformats.org/officeDocument/2006/relationships" xmlns:p="http://schemas.openxmlformats.org/presentationml/2006/main">
   <p:cSld>
     <p:spTree>
       <p:nvGrpSpPr>
@@ -4271,10 +4373,10 @@
       </p:grpSpPr>
       <p:sp>
         <p:nvSpPr>
-          <p:cNvPr id="11" name="TextBox 10">
-            <a:extLst>
-              <a:ext uri="{FF2B5EF4-FFF2-40B4-BE49-F238E27FC236}">
-                <a16:creationId xmlns:a16="http://schemas.microsoft.com/office/drawing/2014/main" id="{8AD6DFE6-7C5D-CE45-8B32-0478A08F5314}"/>
+          <p:cNvPr id="4" name="TextBox 3">
+            <a:extLst>
+              <a:ext uri="{FF2B5EF4-FFF2-40B4-BE49-F238E27FC236}">
+                <a16:creationId xmlns:a16="http://schemas.microsoft.com/office/drawing/2014/main" id="{3F258CE1-AD8D-4E49-AAD2-8030C8B9D87A}"/>
               </a:ext>
             </a:extLst>
           </p:cNvPr>
@@ -4310,10 +4412,10 @@
       </p:sp>
       <p:pic>
         <p:nvPicPr>
-          <p:cNvPr id="14" name="Picture 13">
-            <a:extLst>
-              <a:ext uri="{FF2B5EF4-FFF2-40B4-BE49-F238E27FC236}">
-                <a16:creationId xmlns:a16="http://schemas.microsoft.com/office/drawing/2014/main" id="{886B4874-6672-6943-8F89-136C48409087}"/>
+          <p:cNvPr id="5" name="Picture 4">
+            <a:extLst>
+              <a:ext uri="{FF2B5EF4-FFF2-40B4-BE49-F238E27FC236}">
+                <a16:creationId xmlns:a16="http://schemas.microsoft.com/office/drawing/2014/main" id="{1CB5DE22-9453-B844-81FC-36D2C01B4317}"/>
               </a:ext>
             </a:extLst>
           </p:cNvPr>
@@ -4340,10 +4442,10 @@
       </p:pic>
       <p:sp>
         <p:nvSpPr>
-          <p:cNvPr id="15" name="TextBox 14">
-            <a:extLst>
-              <a:ext uri="{FF2B5EF4-FFF2-40B4-BE49-F238E27FC236}">
-                <a16:creationId xmlns:a16="http://schemas.microsoft.com/office/drawing/2014/main" id="{A8992AE3-F7EA-B54A-9B9E-FD221D4EE884}"/>
+          <p:cNvPr id="6" name="TextBox 5">
+            <a:extLst>
+              <a:ext uri="{FF2B5EF4-FFF2-40B4-BE49-F238E27FC236}">
+                <a16:creationId xmlns:a16="http://schemas.microsoft.com/office/drawing/2014/main" id="{1E4147B9-28CB-314E-9C18-04751207CDE2}"/>
               </a:ext>
             </a:extLst>
           </p:cNvPr>
@@ -4384,10 +4486,10 @@
       </p:sp>
       <p:pic>
         <p:nvPicPr>
-          <p:cNvPr id="3" name="Picture 2" descr="Graphical user interface, text, application&#10;&#10;Description automatically generated">
-            <a:extLst>
-              <a:ext uri="{FF2B5EF4-FFF2-40B4-BE49-F238E27FC236}">
-                <a16:creationId xmlns:a16="http://schemas.microsoft.com/office/drawing/2014/main" id="{E974D4DB-3BFF-024D-BA92-9A85696E5699}"/>
+          <p:cNvPr id="7" name="Picture 6" descr="Graphical user interface, text, application&#10;&#10;Description automatically generated">
+            <a:extLst>
+              <a:ext uri="{FF2B5EF4-FFF2-40B4-BE49-F238E27FC236}">
+                <a16:creationId xmlns:a16="http://schemas.microsoft.com/office/drawing/2014/main" id="{C99BB616-018A-1B45-855B-4FE607A6312F}"/>
               </a:ext>
             </a:extLst>
           </p:cNvPr>
@@ -4414,10 +4516,10 @@
       </p:pic>
       <p:sp>
         <p:nvSpPr>
-          <p:cNvPr id="4" name="TextBox 3">
-            <a:extLst>
-              <a:ext uri="{FF2B5EF4-FFF2-40B4-BE49-F238E27FC236}">
-                <a16:creationId xmlns:a16="http://schemas.microsoft.com/office/drawing/2014/main" id="{EDA2F388-C52A-6D4B-A0C5-C3C98C5F7EB4}"/>
+          <p:cNvPr id="8" name="TextBox 7">
+            <a:extLst>
+              <a:ext uri="{FF2B5EF4-FFF2-40B4-BE49-F238E27FC236}">
+                <a16:creationId xmlns:a16="http://schemas.microsoft.com/office/drawing/2014/main" id="{99E70F83-69EA-DF47-8252-125D69F4F046}"/>
               </a:ext>
             </a:extLst>
           </p:cNvPr>
@@ -4454,7 +4556,7 @@
     </p:spTree>
     <p:extLst>
       <p:ext uri="{BB962C8B-B14F-4D97-AF65-F5344CB8AC3E}">
-        <p14:creationId xmlns:p14="http://schemas.microsoft.com/office/powerpoint/2010/main" val="4001311936"/>
+        <p14:creationId xmlns:p14="http://schemas.microsoft.com/office/powerpoint/2010/main" val="2634397696"/>
       </p:ext>
     </p:extLst>
   </p:cSld>
@@ -4465,7 +4567,7 @@
 </file>
 
 <file path=ppt/slides/slide6.xml><?xml version="1.0" encoding="utf-8"?>
-<p:sld xmlns:a="http://schemas.openxmlformats.org/drawingml/2006/main" xmlns:r="http://schemas.openxmlformats.org/officeDocument/2006/relationships" xmlns:p="http://schemas.openxmlformats.org/presentationml/2006/main" showMasterSp="0">
+<p:sld xmlns:a="http://schemas.openxmlformats.org/drawingml/2006/main" xmlns:r="http://schemas.openxmlformats.org/officeDocument/2006/relationships" xmlns:p="http://schemas.openxmlformats.org/presentationml/2006/main">
   <p:cSld>
     <p:spTree>
       <p:nvGrpSpPr>
@@ -4483,10 +4585,10 @@
       </p:grpSpPr>
       <p:pic>
         <p:nvPicPr>
-          <p:cNvPr id="3" name="Picture 2" descr="Graphical user interface, text&#10;&#10;Description automatically generated">
-            <a:extLst>
-              <a:ext uri="{FF2B5EF4-FFF2-40B4-BE49-F238E27FC236}">
-                <a16:creationId xmlns:a16="http://schemas.microsoft.com/office/drawing/2014/main" id="{2440A847-293E-434B-A374-8983BBC02B16}"/>
+          <p:cNvPr id="4" name="Picture 3" descr="Graphical user interface, text&#10;&#10;Description automatically generated">
+            <a:extLst>
+              <a:ext uri="{FF2B5EF4-FFF2-40B4-BE49-F238E27FC236}">
+                <a16:creationId xmlns:a16="http://schemas.microsoft.com/office/drawing/2014/main" id="{83B1F82A-A7C4-6141-BBF3-B51467C25032}"/>
               </a:ext>
             </a:extLst>
           </p:cNvPr>
@@ -4513,10 +4615,10 @@
       </p:pic>
       <p:sp>
         <p:nvSpPr>
-          <p:cNvPr id="8" name="Title 1">
-            <a:extLst>
-              <a:ext uri="{FF2B5EF4-FFF2-40B4-BE49-F238E27FC236}">
-                <a16:creationId xmlns:a16="http://schemas.microsoft.com/office/drawing/2014/main" id="{D71FD312-6958-E846-840F-2803B6E34E49}"/>
+          <p:cNvPr id="5" name="Title 1">
+            <a:extLst>
+              <a:ext uri="{FF2B5EF4-FFF2-40B4-BE49-F238E27FC236}">
+                <a16:creationId xmlns:a16="http://schemas.microsoft.com/office/drawing/2014/main" id="{3B9025AD-2CF3-A544-8DB8-A2805573ECFC}"/>
               </a:ext>
             </a:extLst>
           </p:cNvPr>
@@ -4551,7 +4653,7 @@
     </p:spTree>
     <p:extLst>
       <p:ext uri="{BB962C8B-B14F-4D97-AF65-F5344CB8AC3E}">
-        <p14:creationId xmlns:p14="http://schemas.microsoft.com/office/powerpoint/2010/main" val="130681259"/>
+        <p14:creationId xmlns:p14="http://schemas.microsoft.com/office/powerpoint/2010/main" val="1686611060"/>
       </p:ext>
     </p:extLst>
   </p:cSld>
@@ -4562,7 +4664,7 @@
 </file>
 
 <file path=ppt/slides/slide7.xml><?xml version="1.0" encoding="utf-8"?>
-<p:sld xmlns:a="http://schemas.openxmlformats.org/drawingml/2006/main" xmlns:r="http://schemas.openxmlformats.org/officeDocument/2006/relationships" xmlns:p="http://schemas.openxmlformats.org/presentationml/2006/main" showMasterSp="0">
+<p:sld xmlns:a="http://schemas.openxmlformats.org/drawingml/2006/main" xmlns:r="http://schemas.openxmlformats.org/officeDocument/2006/relationships" xmlns:p="http://schemas.openxmlformats.org/presentationml/2006/main">
   <p:cSld>
     <p:spTree>
       <p:nvGrpSpPr>
@@ -4580,10 +4682,10 @@
       </p:grpSpPr>
       <p:sp>
         <p:nvSpPr>
-          <p:cNvPr id="2" name="Title 1">
-            <a:extLst>
-              <a:ext uri="{FF2B5EF4-FFF2-40B4-BE49-F238E27FC236}">
-                <a16:creationId xmlns:a16="http://schemas.microsoft.com/office/drawing/2014/main" id="{78F74EFE-EC7D-AD41-9D7C-4D1B44377F5B}"/>
+          <p:cNvPr id="6" name="Title 1">
+            <a:extLst>
+              <a:ext uri="{FF2B5EF4-FFF2-40B4-BE49-F238E27FC236}">
+                <a16:creationId xmlns:a16="http://schemas.microsoft.com/office/drawing/2014/main" id="{22749E24-6532-C144-B7C0-3D0C8C6DB0FF}"/>
               </a:ext>
             </a:extLst>
           </p:cNvPr>
@@ -4594,7 +4696,12 @@
             <p:ph type="title"/>
           </p:nvPr>
         </p:nvSpPr>
-        <p:spPr/>
+        <p:spPr>
+          <a:xfrm>
+            <a:off x="838200" y="365125"/>
+            <a:ext cx="10515600" cy="1325563"/>
+          </a:xfrm>
+        </p:spPr>
         <p:txBody>
           <a:bodyPr/>
           <a:lstStyle/>
@@ -4612,10 +4719,10 @@
       </p:sp>
       <p:pic>
         <p:nvPicPr>
-          <p:cNvPr id="5" name="Content Placeholder 4" descr="Text&#10;&#10;Description automatically generated">
-            <a:extLst>
-              <a:ext uri="{FF2B5EF4-FFF2-40B4-BE49-F238E27FC236}">
-                <a16:creationId xmlns:a16="http://schemas.microsoft.com/office/drawing/2014/main" id="{1405FA92-F544-2B48-A2F4-507B57ACEC8B}"/>
+          <p:cNvPr id="7" name="Content Placeholder 4" descr="Text&#10;&#10;Description automatically generated">
+            <a:extLst>
+              <a:ext uri="{FF2B5EF4-FFF2-40B4-BE49-F238E27FC236}">
+                <a16:creationId xmlns:a16="http://schemas.microsoft.com/office/drawing/2014/main" id="{F711F746-DF28-924A-A3EB-A76A15FC355E}"/>
               </a:ext>
             </a:extLst>
           </p:cNvPr>
@@ -4634,7 +4741,7 @@
         </p:blipFill>
         <p:spPr>
           <a:xfrm>
-            <a:off x="838200" y="2269718"/>
+            <a:off x="838200" y="2195576"/>
             <a:ext cx="10515600" cy="3463152"/>
           </a:xfrm>
         </p:spPr>
@@ -4642,7 +4749,7 @@
     </p:spTree>
     <p:extLst>
       <p:ext uri="{BB962C8B-B14F-4D97-AF65-F5344CB8AC3E}">
-        <p14:creationId xmlns:p14="http://schemas.microsoft.com/office/powerpoint/2010/main" val="2679446250"/>
+        <p14:creationId xmlns:p14="http://schemas.microsoft.com/office/powerpoint/2010/main" val="2655079831"/>
       </p:ext>
     </p:extLst>
   </p:cSld>
@@ -4653,7 +4760,7 @@
 </file>
 
 <file path=ppt/slides/slide8.xml><?xml version="1.0" encoding="utf-8"?>
-<p:sld xmlns:a="http://schemas.openxmlformats.org/drawingml/2006/main" xmlns:r="http://schemas.openxmlformats.org/officeDocument/2006/relationships" xmlns:p="http://schemas.openxmlformats.org/presentationml/2006/main" showMasterSp="0">
+<p:sld xmlns:a="http://schemas.openxmlformats.org/drawingml/2006/main" xmlns:r="http://schemas.openxmlformats.org/officeDocument/2006/relationships" xmlns:p="http://schemas.openxmlformats.org/presentationml/2006/main">
   <p:cSld>
     <p:spTree>
       <p:nvGrpSpPr>
@@ -4671,10 +4778,10 @@
       </p:grpSpPr>
       <p:sp>
         <p:nvSpPr>
-          <p:cNvPr id="2" name="Title 1">
-            <a:extLst>
-              <a:ext uri="{FF2B5EF4-FFF2-40B4-BE49-F238E27FC236}">
-                <a16:creationId xmlns:a16="http://schemas.microsoft.com/office/drawing/2014/main" id="{CF3A82F5-1A1E-B04A-B0F9-B5FB8B893C16}"/>
+          <p:cNvPr id="8" name="Title 1">
+            <a:extLst>
+              <a:ext uri="{FF2B5EF4-FFF2-40B4-BE49-F238E27FC236}">
+                <a16:creationId xmlns:a16="http://schemas.microsoft.com/office/drawing/2014/main" id="{3FCEA06E-2B20-664E-8AAC-173517EECBA4}"/>
               </a:ext>
             </a:extLst>
           </p:cNvPr>
@@ -4685,7 +4792,12 @@
             <p:ph type="title"/>
           </p:nvPr>
         </p:nvSpPr>
-        <p:spPr/>
+        <p:spPr>
+          <a:xfrm>
+            <a:off x="838200" y="365125"/>
+            <a:ext cx="10515600" cy="1325563"/>
+          </a:xfrm>
+        </p:spPr>
         <p:txBody>
           <a:bodyPr/>
           <a:lstStyle/>
@@ -4703,10 +4815,10 @@
       </p:sp>
       <p:pic>
         <p:nvPicPr>
-          <p:cNvPr id="5" name="Content Placeholder 4" descr="Text&#10;&#10;Description automatically generated">
-            <a:extLst>
-              <a:ext uri="{FF2B5EF4-FFF2-40B4-BE49-F238E27FC236}">
-                <a16:creationId xmlns:a16="http://schemas.microsoft.com/office/drawing/2014/main" id="{5820FDFC-05EF-F94F-A72C-15D87E974010}"/>
+          <p:cNvPr id="9" name="Content Placeholder 4" descr="Text&#10;&#10;Description automatically generated">
+            <a:extLst>
+              <a:ext uri="{FF2B5EF4-FFF2-40B4-BE49-F238E27FC236}">
+                <a16:creationId xmlns:a16="http://schemas.microsoft.com/office/drawing/2014/main" id="{CD01898F-B5E1-4143-B171-2FEA8A703744}"/>
               </a:ext>
             </a:extLst>
           </p:cNvPr>
@@ -4732,10 +4844,10 @@
       </p:pic>
       <p:cxnSp>
         <p:nvCxnSpPr>
-          <p:cNvPr id="8" name="Straight Arrow Connector 7">
-            <a:extLst>
-              <a:ext uri="{FF2B5EF4-FFF2-40B4-BE49-F238E27FC236}">
-                <a16:creationId xmlns:a16="http://schemas.microsoft.com/office/drawing/2014/main" id="{37FB9F1F-3551-C54F-812D-F18D3FAD1FFB}"/>
+          <p:cNvPr id="10" name="Straight Arrow Connector 9">
+            <a:extLst>
+              <a:ext uri="{FF2B5EF4-FFF2-40B4-BE49-F238E27FC236}">
+                <a16:creationId xmlns:a16="http://schemas.microsoft.com/office/drawing/2014/main" id="{4AC07108-74B8-D040-9155-557C373820D0}"/>
               </a:ext>
             </a:extLst>
           </p:cNvPr>
@@ -4751,6 +4863,9 @@
             <a:avLst/>
           </a:prstGeom>
           <a:ln>
+            <a:solidFill>
+              <a:schemeClr val="bg1"/>
+            </a:solidFill>
             <a:tailEnd type="triangle"/>
           </a:ln>
         </p:spPr>
@@ -4771,10 +4886,10 @@
       </p:cxnSp>
       <p:sp>
         <p:nvSpPr>
-          <p:cNvPr id="9" name="TextBox 8">
-            <a:extLst>
-              <a:ext uri="{FF2B5EF4-FFF2-40B4-BE49-F238E27FC236}">
-                <a16:creationId xmlns:a16="http://schemas.microsoft.com/office/drawing/2014/main" id="{DF107A0A-F356-EE49-A179-324679C3E058}"/>
+          <p:cNvPr id="11" name="TextBox 10">
+            <a:extLst>
+              <a:ext uri="{FF2B5EF4-FFF2-40B4-BE49-F238E27FC236}">
+                <a16:creationId xmlns:a16="http://schemas.microsoft.com/office/drawing/2014/main" id="{F291FB2D-3DEB-2746-9A3C-1D6E2093AC22}"/>
               </a:ext>
             </a:extLst>
           </p:cNvPr>
@@ -4784,7 +4899,7 @@
         <p:spPr>
           <a:xfrm>
             <a:off x="5545015" y="4841631"/>
-            <a:ext cx="2048318" cy="369332"/>
+            <a:ext cx="2085186" cy="369332"/>
           </a:xfrm>
           <a:prstGeom prst="rect">
             <a:avLst/>
@@ -4798,16 +4913,25 @@
           <a:lstStyle/>
           <a:p>
             <a:r>
-              <a:rPr lang="en-US" dirty="0"/>
-              <a:t>Mutable Preference</a:t>
-            </a:r>
+              <a:rPr lang="en-IN" dirty="0">
+                <a:solidFill>
+                  <a:schemeClr val="bg1"/>
+                </a:solidFill>
+              </a:rPr>
+              <a:t>MutablePreferences</a:t>
+            </a:r>
+            <a:endParaRPr lang="en-US" dirty="0">
+              <a:solidFill>
+                <a:schemeClr val="bg1"/>
+              </a:solidFill>
+            </a:endParaRPr>
           </a:p>
         </p:txBody>
       </p:sp>
     </p:spTree>
     <p:extLst>
       <p:ext uri="{BB962C8B-B14F-4D97-AF65-F5344CB8AC3E}">
-        <p14:creationId xmlns:p14="http://schemas.microsoft.com/office/powerpoint/2010/main" val="1250250957"/>
+        <p14:creationId xmlns:p14="http://schemas.microsoft.com/office/powerpoint/2010/main" val="3231448365"/>
       </p:ext>
     </p:extLst>
   </p:cSld>
@@ -4818,7 +4942,7 @@
 </file>
 
 <file path=ppt/slides/slide9.xml><?xml version="1.0" encoding="utf-8"?>
-<p:sld xmlns:a="http://schemas.openxmlformats.org/drawingml/2006/main" xmlns:r="http://schemas.openxmlformats.org/officeDocument/2006/relationships" xmlns:p="http://schemas.openxmlformats.org/presentationml/2006/main" showMasterSp="0">
+<p:sld xmlns:a="http://schemas.openxmlformats.org/drawingml/2006/main" xmlns:r="http://schemas.openxmlformats.org/officeDocument/2006/relationships" xmlns:p="http://schemas.openxmlformats.org/presentationml/2006/main">
   <p:cSld>
     <p:spTree>
       <p:nvGrpSpPr>
@@ -4836,10 +4960,10 @@
       </p:grpSpPr>
       <p:sp>
         <p:nvSpPr>
-          <p:cNvPr id="2" name="Title 1">
-            <a:extLst>
-              <a:ext uri="{FF2B5EF4-FFF2-40B4-BE49-F238E27FC236}">
-                <a16:creationId xmlns:a16="http://schemas.microsoft.com/office/drawing/2014/main" id="{686F5990-0C4A-C84F-B472-81E1A8352A9A}"/>
+          <p:cNvPr id="4" name="Title 1">
+            <a:extLst>
+              <a:ext uri="{FF2B5EF4-FFF2-40B4-BE49-F238E27FC236}">
+                <a16:creationId xmlns:a16="http://schemas.microsoft.com/office/drawing/2014/main" id="{7731D72E-18C1-7143-8028-B65A1C872591}"/>
               </a:ext>
             </a:extLst>
           </p:cNvPr>
@@ -4850,7 +4974,12 @@
             <p:ph type="title"/>
           </p:nvPr>
         </p:nvSpPr>
-        <p:spPr/>
+        <p:spPr>
+          <a:xfrm>
+            <a:off x="838200" y="365125"/>
+            <a:ext cx="10515600" cy="1325563"/>
+          </a:xfrm>
+        </p:spPr>
         <p:txBody>
           <a:bodyPr/>
           <a:lstStyle/>
@@ -4871,7 +5000,7 @@
           <p:cNvPr id="5" name="Content Placeholder 4" descr="Text&#10;&#10;Description automatically generated">
             <a:extLst>
               <a:ext uri="{FF2B5EF4-FFF2-40B4-BE49-F238E27FC236}">
-                <a16:creationId xmlns:a16="http://schemas.microsoft.com/office/drawing/2014/main" id="{691F012F-3B1C-174D-A333-B749C3A29188}"/>
+                <a16:creationId xmlns:a16="http://schemas.microsoft.com/office/drawing/2014/main" id="{5E540944-9396-1643-A166-C995C44C00B0}"/>
               </a:ext>
             </a:extLst>
           </p:cNvPr>
@@ -4898,7 +5027,7 @@
     </p:spTree>
     <p:extLst>
       <p:ext uri="{BB962C8B-B14F-4D97-AF65-F5344CB8AC3E}">
-        <p14:creationId xmlns:p14="http://schemas.microsoft.com/office/powerpoint/2010/main" val="1099338862"/>
+        <p14:creationId xmlns:p14="http://schemas.microsoft.com/office/powerpoint/2010/main" val="3357452663"/>
       </p:ext>
     </p:extLst>
   </p:cSld>

</xml_diff>

<commit_message>
Added more functionalities , modified ppt
</commit_message>
<xml_diff>
--- a/DataStore.pptx
+++ b/DataStore.pptx
@@ -15,9 +15,20 @@
     <p:sldId id="261" r:id="rId9"/>
     <p:sldId id="262" r:id="rId10"/>
     <p:sldId id="267" r:id="rId11"/>
-    <p:sldId id="263" r:id="rId12"/>
-    <p:sldId id="264" r:id="rId13"/>
-    <p:sldId id="265" r:id="rId14"/>
+    <p:sldId id="279" r:id="rId12"/>
+    <p:sldId id="270" r:id="rId13"/>
+    <p:sldId id="271" r:id="rId14"/>
+    <p:sldId id="272" r:id="rId15"/>
+    <p:sldId id="273" r:id="rId16"/>
+    <p:sldId id="274" r:id="rId17"/>
+    <p:sldId id="275" r:id="rId18"/>
+    <p:sldId id="276" r:id="rId19"/>
+    <p:sldId id="277" r:id="rId20"/>
+    <p:sldId id="278" r:id="rId21"/>
+    <p:sldId id="280" r:id="rId22"/>
+    <p:sldId id="263" r:id="rId23"/>
+    <p:sldId id="264" r:id="rId24"/>
+    <p:sldId id="265" r:id="rId25"/>
   </p:sldIdLst>
   <p:sldSz cx="12192000" cy="6858000"/>
   <p:notesSz cx="6858000" cy="9144000"/>
@@ -273,7 +284,7 @@
           <a:p>
             <a:fld id="{1B74956C-C24C-CA49-8E6A-9F18C21F9F36}" type="datetimeFigureOut">
               <a:rPr lang="en-US" smtClean="0"/>
-              <a:t>6/29/21</a:t>
+              <a:t>7/1/21</a:t>
             </a:fld>
             <a:endParaRPr lang="en-US"/>
           </a:p>
@@ -529,7 +540,7 @@
           <a:p>
             <a:fld id="{1B74956C-C24C-CA49-8E6A-9F18C21F9F36}" type="datetimeFigureOut">
               <a:rPr lang="en-US" smtClean="0"/>
-              <a:t>6/29/21</a:t>
+              <a:t>7/1/21</a:t>
             </a:fld>
             <a:endParaRPr lang="en-US"/>
           </a:p>
@@ -739,7 +750,7 @@
           <a:p>
             <a:fld id="{1B74956C-C24C-CA49-8E6A-9F18C21F9F36}" type="datetimeFigureOut">
               <a:rPr lang="en-US" smtClean="0"/>
-              <a:t>6/29/21</a:t>
+              <a:t>7/1/21</a:t>
             </a:fld>
             <a:endParaRPr lang="en-US"/>
           </a:p>
@@ -1253,7 +1264,7 @@
           <a:p>
             <a:fld id="{1B74956C-C24C-CA49-8E6A-9F18C21F9F36}" type="datetimeFigureOut">
               <a:rPr lang="en-US" smtClean="0"/>
-              <a:t>6/29/21</a:t>
+              <a:t>7/1/21</a:t>
             </a:fld>
             <a:endParaRPr lang="en-US"/>
           </a:p>
@@ -1521,7 +1532,7 @@
           <a:p>
             <a:fld id="{1B74956C-C24C-CA49-8E6A-9F18C21F9F36}" type="datetimeFigureOut">
               <a:rPr lang="en-US" smtClean="0"/>
-              <a:t>6/29/21</a:t>
+              <a:t>7/1/21</a:t>
             </a:fld>
             <a:endParaRPr lang="en-US"/>
           </a:p>
@@ -1936,7 +1947,7 @@
           <a:p>
             <a:fld id="{1B74956C-C24C-CA49-8E6A-9F18C21F9F36}" type="datetimeFigureOut">
               <a:rPr lang="en-US" smtClean="0"/>
-              <a:t>6/29/21</a:t>
+              <a:t>7/1/21</a:t>
             </a:fld>
             <a:endParaRPr lang="en-US"/>
           </a:p>
@@ -2078,7 +2089,7 @@
           <a:p>
             <a:fld id="{1B74956C-C24C-CA49-8E6A-9F18C21F9F36}" type="datetimeFigureOut">
               <a:rPr lang="en-US" smtClean="0"/>
-              <a:t>6/29/21</a:t>
+              <a:t>7/1/21</a:t>
             </a:fld>
             <a:endParaRPr lang="en-US"/>
           </a:p>
@@ -2191,7 +2202,7 @@
           <a:p>
             <a:fld id="{1B74956C-C24C-CA49-8E6A-9F18C21F9F36}" type="datetimeFigureOut">
               <a:rPr lang="en-US" smtClean="0"/>
-              <a:t>6/29/21</a:t>
+              <a:t>7/1/21</a:t>
             </a:fld>
             <a:endParaRPr lang="en-US"/>
           </a:p>
@@ -2504,7 +2515,7 @@
           <a:p>
             <a:fld id="{1B74956C-C24C-CA49-8E6A-9F18C21F9F36}" type="datetimeFigureOut">
               <a:rPr lang="en-US" smtClean="0"/>
-              <a:t>6/29/21</a:t>
+              <a:t>7/1/21</a:t>
             </a:fld>
             <a:endParaRPr lang="en-US"/>
           </a:p>
@@ -2793,7 +2804,7 @@
           <a:p>
             <a:fld id="{1B74956C-C24C-CA49-8E6A-9F18C21F9F36}" type="datetimeFigureOut">
               <a:rPr lang="en-US" smtClean="0"/>
-              <a:t>6/29/21</a:t>
+              <a:t>7/1/21</a:t>
             </a:fld>
             <a:endParaRPr lang="en-US"/>
           </a:p>
@@ -3686,35 +3697,34 @@
           <p:cNvPr id="2" name="Title 1">
             <a:extLst>
               <a:ext uri="{FF2B5EF4-FFF2-40B4-BE49-F238E27FC236}">
-                <a16:creationId xmlns:a16="http://schemas.microsoft.com/office/drawing/2014/main" id="{59BE37D6-92C7-FC4B-8C71-0418BCAED9C0}"/>
-              </a:ext>
-            </a:extLst>
-          </p:cNvPr>
-          <p:cNvSpPr>
-            <a:spLocks noGrp="1"/>
-          </p:cNvSpPr>
-          <p:nvPr>
-            <p:ph type="title"/>
+                <a16:creationId xmlns:a16="http://schemas.microsoft.com/office/drawing/2014/main" id="{583818F7-69B6-A34B-A68B-53BFCC752998}"/>
+              </a:ext>
+            </a:extLst>
+          </p:cNvPr>
+          <p:cNvSpPr>
+            <a:spLocks noGrp="1"/>
+          </p:cNvSpPr>
+          <p:nvPr>
+            <p:ph type="ctrTitle"/>
           </p:nvPr>
         </p:nvSpPr>
         <p:spPr>
           <a:xfrm>
-            <a:off x="838200" y="2766218"/>
-            <a:ext cx="10515600" cy="1325563"/>
+            <a:off x="1524000" y="2913736"/>
+            <a:ext cx="9144000" cy="1030528"/>
           </a:xfrm>
         </p:spPr>
         <p:txBody>
           <a:bodyPr/>
           <a:lstStyle/>
           <a:p>
-            <a:pPr algn="ctr"/>
             <a:r>
               <a:rPr lang="en-US" dirty="0">
                 <a:solidFill>
                   <a:schemeClr val="bg1"/>
                 </a:solidFill>
               </a:rPr>
-              <a:t>Demo</a:t>
+              <a:t>Proto Data Store</a:t>
             </a:r>
           </a:p>
         </p:txBody>
@@ -3722,7 +3732,7 @@
     </p:spTree>
     <p:extLst>
       <p:ext uri="{BB962C8B-B14F-4D97-AF65-F5344CB8AC3E}">
-        <p14:creationId xmlns:p14="http://schemas.microsoft.com/office/powerpoint/2010/main" val="3423347409"/>
+        <p14:creationId xmlns:p14="http://schemas.microsoft.com/office/powerpoint/2010/main" val="3489539115"/>
       </p:ext>
     </p:extLst>
   </p:cSld>
@@ -3733,7 +3743,7 @@
 </file>
 
 <file path=ppt/slides/slide12.xml><?xml version="1.0" encoding="utf-8"?>
-<p:sld xmlns:a="http://schemas.openxmlformats.org/drawingml/2006/main" xmlns:r="http://schemas.openxmlformats.org/officeDocument/2006/relationships" xmlns:p="http://schemas.openxmlformats.org/presentationml/2006/main" showMasterSp="0">
+<p:sld xmlns:a="http://schemas.openxmlformats.org/drawingml/2006/main" xmlns:r="http://schemas.openxmlformats.org/officeDocument/2006/relationships" xmlns:p="http://schemas.openxmlformats.org/presentationml/2006/main">
   <p:cSld>
     <p:spTree>
       <p:nvGrpSpPr>
@@ -3754,7 +3764,7 @@
           <p:cNvPr id="2" name="Title 1">
             <a:extLst>
               <a:ext uri="{FF2B5EF4-FFF2-40B4-BE49-F238E27FC236}">
-                <a16:creationId xmlns:a16="http://schemas.microsoft.com/office/drawing/2014/main" id="{4576B776-6CFC-304C-95F3-56984D283CEA}"/>
+                <a16:creationId xmlns:a16="http://schemas.microsoft.com/office/drawing/2014/main" id="{41DA5064-D8EE-E448-9B4E-FC1DADAA6DF1}"/>
               </a:ext>
             </a:extLst>
           </p:cNvPr>
@@ -3765,24 +3775,66 @@
             <p:ph type="title"/>
           </p:nvPr>
         </p:nvSpPr>
-        <p:spPr>
-          <a:xfrm>
-            <a:off x="838200" y="2766218"/>
-            <a:ext cx="10515600" cy="1325563"/>
-          </a:xfrm>
-        </p:spPr>
-        <p:txBody>
-          <a:bodyPr/>
-          <a:lstStyle/>
-          <a:p>
-            <a:pPr algn="ctr"/>
+        <p:spPr/>
+        <p:txBody>
+          <a:bodyPr/>
+          <a:lstStyle/>
+          <a:p>
             <a:r>
               <a:rPr lang="en-US" dirty="0">
                 <a:solidFill>
                   <a:schemeClr val="bg1"/>
                 </a:solidFill>
               </a:rPr>
-              <a:t>Questions?</a:t>
+              <a:t>Prerequisites</a:t>
+            </a:r>
+          </a:p>
+        </p:txBody>
+      </p:sp>
+      <p:sp>
+        <p:nvSpPr>
+          <p:cNvPr id="3" name="Content Placeholder 2">
+            <a:extLst>
+              <a:ext uri="{FF2B5EF4-FFF2-40B4-BE49-F238E27FC236}">
+                <a16:creationId xmlns:a16="http://schemas.microsoft.com/office/drawing/2014/main" id="{2CDFB3A9-7A25-3646-BAEB-7EAA390F3282}"/>
+              </a:ext>
+            </a:extLst>
+          </p:cNvPr>
+          <p:cNvSpPr>
+            <a:spLocks noGrp="1"/>
+          </p:cNvSpPr>
+          <p:nvPr>
+            <p:ph idx="1"/>
+          </p:nvPr>
+        </p:nvSpPr>
+        <p:spPr/>
+        <p:txBody>
+          <a:bodyPr/>
+          <a:lstStyle/>
+          <a:p>
+            <a:r>
+              <a:rPr lang="en-US" dirty="0">
+                <a:solidFill>
+                  <a:schemeClr val="bg1"/>
+                </a:solidFill>
+              </a:rPr>
+              <a:t>Protocol Buffers (</a:t>
+            </a:r>
+            <a:r>
+              <a:rPr lang="en-US" dirty="0" err="1">
+                <a:solidFill>
+                  <a:schemeClr val="bg1"/>
+                </a:solidFill>
+              </a:rPr>
+              <a:t>Protobuf</a:t>
+            </a:r>
+            <a:r>
+              <a:rPr lang="en-US" dirty="0">
+                <a:solidFill>
+                  <a:schemeClr val="bg1"/>
+                </a:solidFill>
+              </a:rPr>
+              <a:t>)</a:t>
             </a:r>
           </a:p>
         </p:txBody>
@@ -3790,7 +3842,7 @@
     </p:spTree>
     <p:extLst>
       <p:ext uri="{BB962C8B-B14F-4D97-AF65-F5344CB8AC3E}">
-        <p14:creationId xmlns:p14="http://schemas.microsoft.com/office/powerpoint/2010/main" val="2149673806"/>
+        <p14:creationId xmlns:p14="http://schemas.microsoft.com/office/powerpoint/2010/main" val="2842643691"/>
       </p:ext>
     </p:extLst>
   </p:cSld>
@@ -3801,7 +3853,7 @@
 </file>
 
 <file path=ppt/slides/slide13.xml><?xml version="1.0" encoding="utf-8"?>
-<p:sld xmlns:a="http://schemas.openxmlformats.org/drawingml/2006/main" xmlns:r="http://schemas.openxmlformats.org/officeDocument/2006/relationships" xmlns:p="http://schemas.openxmlformats.org/presentationml/2006/main" showMasterSp="0">
+<p:sld xmlns:a="http://schemas.openxmlformats.org/drawingml/2006/main" xmlns:r="http://schemas.openxmlformats.org/officeDocument/2006/relationships" xmlns:p="http://schemas.openxmlformats.org/presentationml/2006/main">
   <p:cSld>
     <p:spTree>
       <p:nvGrpSpPr>
@@ -3822,7 +3874,7 @@
           <p:cNvPr id="2" name="Title 1">
             <a:extLst>
               <a:ext uri="{FF2B5EF4-FFF2-40B4-BE49-F238E27FC236}">
-                <a16:creationId xmlns:a16="http://schemas.microsoft.com/office/drawing/2014/main" id="{F86059A6-12B3-D243-BD3E-7F9EB6780670}"/>
+                <a16:creationId xmlns:a16="http://schemas.microsoft.com/office/drawing/2014/main" id="{07A44F7D-96FF-F545-B347-60AF6759298D}"/>
               </a:ext>
             </a:extLst>
           </p:cNvPr>
@@ -3833,24 +3885,116 @@
             <p:ph type="title"/>
           </p:nvPr>
         </p:nvSpPr>
-        <p:spPr>
-          <a:xfrm>
-            <a:off x="838200" y="2766218"/>
-            <a:ext cx="10515600" cy="1325563"/>
-          </a:xfrm>
-        </p:spPr>
-        <p:txBody>
-          <a:bodyPr/>
-          <a:lstStyle/>
-          <a:p>
-            <a:pPr algn="ctr"/>
+        <p:spPr/>
+        <p:txBody>
+          <a:bodyPr/>
+          <a:lstStyle/>
+          <a:p>
             <a:r>
               <a:rPr lang="en-US" dirty="0">
                 <a:solidFill>
                   <a:schemeClr val="bg1"/>
                 </a:solidFill>
               </a:rPr>
-              <a:t>Thank you!</a:t>
+              <a:t>What are protocol buffers ?</a:t>
+            </a:r>
+          </a:p>
+        </p:txBody>
+      </p:sp>
+      <p:sp>
+        <p:nvSpPr>
+          <p:cNvPr id="3" name="Content Placeholder 2">
+            <a:extLst>
+              <a:ext uri="{FF2B5EF4-FFF2-40B4-BE49-F238E27FC236}">
+                <a16:creationId xmlns:a16="http://schemas.microsoft.com/office/drawing/2014/main" id="{C574D0E1-2B38-4349-B576-56ED59CCD4AB}"/>
+              </a:ext>
+            </a:extLst>
+          </p:cNvPr>
+          <p:cNvSpPr>
+            <a:spLocks noGrp="1"/>
+          </p:cNvSpPr>
+          <p:nvPr>
+            <p:ph idx="1"/>
+          </p:nvPr>
+        </p:nvSpPr>
+        <p:spPr/>
+        <p:txBody>
+          <a:bodyPr/>
+          <a:lstStyle/>
+          <a:p>
+            <a:r>
+              <a:rPr lang="en-US" dirty="0">
+                <a:solidFill>
+                  <a:schemeClr val="bg1"/>
+                </a:solidFill>
+              </a:rPr>
+              <a:t>Language neutral</a:t>
+            </a:r>
+          </a:p>
+          <a:p>
+            <a:r>
+              <a:rPr lang="en-US" dirty="0">
+                <a:solidFill>
+                  <a:schemeClr val="bg1"/>
+                </a:solidFill>
+              </a:rPr>
+              <a:t>Platform neutral</a:t>
+            </a:r>
+          </a:p>
+          <a:p>
+            <a:r>
+              <a:rPr lang="en-US" dirty="0">
+                <a:solidFill>
+                  <a:schemeClr val="bg1"/>
+                </a:solidFill>
+              </a:rPr>
+              <a:t>Like xml but smaller faster and simpler</a:t>
+            </a:r>
+          </a:p>
+          <a:p>
+            <a:r>
+              <a:rPr lang="en-US" dirty="0">
+                <a:solidFill>
+                  <a:schemeClr val="bg1"/>
+                </a:solidFill>
+              </a:rPr>
+              <a:t>Data needs to structured only once can also be called as schema</a:t>
+            </a:r>
+          </a:p>
+          <a:p>
+            <a:r>
+              <a:rPr lang="en-US" dirty="0">
+                <a:solidFill>
+                  <a:schemeClr val="bg1"/>
+                </a:solidFill>
+              </a:rPr>
+              <a:t>Once structured, read, write and </a:t>
+            </a:r>
+            <a:r>
+              <a:rPr lang="en-US" dirty="0" err="1">
+                <a:solidFill>
+                  <a:schemeClr val="bg1"/>
+                </a:solidFill>
+              </a:rPr>
+              <a:t>updation</a:t>
+            </a:r>
+            <a:r>
+              <a:rPr lang="en-US" dirty="0">
+                <a:solidFill>
+                  <a:schemeClr val="bg1"/>
+                </a:solidFill>
+              </a:rPr>
+              <a:t> can be performed easily using special generated code. </a:t>
+            </a:r>
+          </a:p>
+          <a:p>
+            <a:r>
+              <a:rPr lang="en-US" dirty="0">
+                <a:solidFill>
+                  <a:schemeClr val="bg1"/>
+                </a:solidFill>
+              </a:rPr>
+              <a:t>Languages supported: Java/Kotlin, Python, Objective-C, C++, C#, Dart, Go and Ruby</a:t>
             </a:r>
           </a:p>
         </p:txBody>
@@ -3858,7 +4002,592 @@
     </p:spTree>
     <p:extLst>
       <p:ext uri="{BB962C8B-B14F-4D97-AF65-F5344CB8AC3E}">
-        <p14:creationId xmlns:p14="http://schemas.microsoft.com/office/powerpoint/2010/main" val="2977985380"/>
+        <p14:creationId xmlns:p14="http://schemas.microsoft.com/office/powerpoint/2010/main" val="1913182771"/>
+      </p:ext>
+    </p:extLst>
+  </p:cSld>
+  <p:clrMapOvr>
+    <a:masterClrMapping/>
+  </p:clrMapOvr>
+</p:sld>
+</file>
+
+<file path=ppt/slides/slide14.xml><?xml version="1.0" encoding="utf-8"?>
+<p:sld xmlns:a="http://schemas.openxmlformats.org/drawingml/2006/main" xmlns:r="http://schemas.openxmlformats.org/officeDocument/2006/relationships" xmlns:p="http://schemas.openxmlformats.org/presentationml/2006/main">
+  <p:cSld>
+    <p:spTree>
+      <p:nvGrpSpPr>
+        <p:cNvPr id="1" name=""/>
+        <p:cNvGrpSpPr/>
+        <p:nvPr/>
+      </p:nvGrpSpPr>
+      <p:grpSpPr>
+        <a:xfrm>
+          <a:off x="0" y="0"/>
+          <a:ext cx="0" cy="0"/>
+          <a:chOff x="0" y="0"/>
+          <a:chExt cx="0" cy="0"/>
+        </a:xfrm>
+      </p:grpSpPr>
+      <p:sp>
+        <p:nvSpPr>
+          <p:cNvPr id="2" name="Title 1">
+            <a:extLst>
+              <a:ext uri="{FF2B5EF4-FFF2-40B4-BE49-F238E27FC236}">
+                <a16:creationId xmlns:a16="http://schemas.microsoft.com/office/drawing/2014/main" id="{D5DD6261-9CF7-F346-A284-CB29A39AAE74}"/>
+              </a:ext>
+            </a:extLst>
+          </p:cNvPr>
+          <p:cNvSpPr>
+            <a:spLocks noGrp="1"/>
+          </p:cNvSpPr>
+          <p:nvPr>
+            <p:ph type="title"/>
+          </p:nvPr>
+        </p:nvSpPr>
+        <p:spPr/>
+        <p:txBody>
+          <a:bodyPr/>
+          <a:lstStyle/>
+          <a:p>
+            <a:r>
+              <a:rPr lang="en-US" dirty="0">
+                <a:solidFill>
+                  <a:schemeClr val="bg1"/>
+                </a:solidFill>
+              </a:rPr>
+              <a:t>Example of a Proto file -</a:t>
+            </a:r>
+          </a:p>
+        </p:txBody>
+      </p:sp>
+      <p:pic>
+        <p:nvPicPr>
+          <p:cNvPr id="5" name="Content Placeholder 4" descr="A picture containing text&#10;&#10;Description automatically generated">
+            <a:extLst>
+              <a:ext uri="{FF2B5EF4-FFF2-40B4-BE49-F238E27FC236}">
+                <a16:creationId xmlns:a16="http://schemas.microsoft.com/office/drawing/2014/main" id="{5E5B0F8C-7DE3-C043-BD85-BA8454CB61D2}"/>
+              </a:ext>
+            </a:extLst>
+          </p:cNvPr>
+          <p:cNvPicPr>
+            <a:picLocks noGrp="1" noChangeAspect="1"/>
+          </p:cNvPicPr>
+          <p:nvPr>
+            <p:ph idx="1"/>
+          </p:nvPr>
+        </p:nvPicPr>
+        <p:blipFill>
+          <a:blip r:embed="rId2"/>
+          <a:stretch>
+            <a:fillRect/>
+          </a:stretch>
+        </p:blipFill>
+        <p:spPr>
+          <a:xfrm>
+            <a:off x="996950" y="2959894"/>
+            <a:ext cx="10198100" cy="2082800"/>
+          </a:xfrm>
+        </p:spPr>
+      </p:pic>
+      <p:sp>
+        <p:nvSpPr>
+          <p:cNvPr id="7" name="TextBox 6">
+            <a:extLst>
+              <a:ext uri="{FF2B5EF4-FFF2-40B4-BE49-F238E27FC236}">
+                <a16:creationId xmlns:a16="http://schemas.microsoft.com/office/drawing/2014/main" id="{6924D742-F20D-6D4E-AFF6-276F0FF96030}"/>
+              </a:ext>
+            </a:extLst>
+          </p:cNvPr>
+          <p:cNvSpPr txBox="1"/>
+          <p:nvPr/>
+        </p:nvSpPr>
+        <p:spPr>
+          <a:xfrm>
+            <a:off x="996950" y="2438400"/>
+            <a:ext cx="4341317" cy="369332"/>
+          </a:xfrm>
+          <a:prstGeom prst="rect">
+            <a:avLst/>
+          </a:prstGeom>
+          <a:noFill/>
+        </p:spPr>
+        <p:txBody>
+          <a:bodyPr wrap="none" rtlCol="0">
+            <a:spAutoFit/>
+          </a:bodyPr>
+          <a:lstStyle/>
+          <a:p>
+            <a:r>
+              <a:rPr lang="en-US" dirty="0">
+                <a:solidFill>
+                  <a:schemeClr val="bg1"/>
+                </a:solidFill>
+              </a:rPr>
+              <a:t>This file is saved by the extension of “.proto”</a:t>
+            </a:r>
+          </a:p>
+        </p:txBody>
+      </p:sp>
+    </p:spTree>
+    <p:extLst>
+      <p:ext uri="{BB962C8B-B14F-4D97-AF65-F5344CB8AC3E}">
+        <p14:creationId xmlns:p14="http://schemas.microsoft.com/office/powerpoint/2010/main" val="3098171544"/>
+      </p:ext>
+    </p:extLst>
+  </p:cSld>
+  <p:clrMapOvr>
+    <a:masterClrMapping/>
+  </p:clrMapOvr>
+</p:sld>
+</file>
+
+<file path=ppt/slides/slide15.xml><?xml version="1.0" encoding="utf-8"?>
+<p:sld xmlns:a="http://schemas.openxmlformats.org/drawingml/2006/main" xmlns:r="http://schemas.openxmlformats.org/officeDocument/2006/relationships" xmlns:p="http://schemas.openxmlformats.org/presentationml/2006/main">
+  <p:cSld>
+    <p:spTree>
+      <p:nvGrpSpPr>
+        <p:cNvPr id="1" name=""/>
+        <p:cNvGrpSpPr/>
+        <p:nvPr/>
+      </p:nvGrpSpPr>
+      <p:grpSpPr>
+        <a:xfrm>
+          <a:off x="0" y="0"/>
+          <a:ext cx="0" cy="0"/>
+          <a:chOff x="0" y="0"/>
+          <a:chExt cx="0" cy="0"/>
+        </a:xfrm>
+      </p:grpSpPr>
+      <p:sp>
+        <p:nvSpPr>
+          <p:cNvPr id="2" name="Title 1">
+            <a:extLst>
+              <a:ext uri="{FF2B5EF4-FFF2-40B4-BE49-F238E27FC236}">
+                <a16:creationId xmlns:a16="http://schemas.microsoft.com/office/drawing/2014/main" id="{D0F271D2-E898-CC4A-BB0E-28EFEC552D33}"/>
+              </a:ext>
+            </a:extLst>
+          </p:cNvPr>
+          <p:cNvSpPr>
+            <a:spLocks noGrp="1"/>
+          </p:cNvSpPr>
+          <p:nvPr>
+            <p:ph type="title"/>
+          </p:nvPr>
+        </p:nvSpPr>
+        <p:spPr/>
+        <p:txBody>
+          <a:bodyPr/>
+          <a:lstStyle/>
+          <a:p>
+            <a:r>
+              <a:rPr lang="en-US" dirty="0">
+                <a:solidFill>
+                  <a:schemeClr val="bg1"/>
+                </a:solidFill>
+              </a:rPr>
+              <a:t>Setting up Serializer</a:t>
+            </a:r>
+          </a:p>
+        </p:txBody>
+      </p:sp>
+      <p:pic>
+        <p:nvPicPr>
+          <p:cNvPr id="5" name="Content Placeholder 4">
+            <a:extLst>
+              <a:ext uri="{FF2B5EF4-FFF2-40B4-BE49-F238E27FC236}">
+                <a16:creationId xmlns:a16="http://schemas.microsoft.com/office/drawing/2014/main" id="{54FEB8C7-023A-1644-9F8C-D1B5A6C1AD68}"/>
+              </a:ext>
+            </a:extLst>
+          </p:cNvPr>
+          <p:cNvPicPr>
+            <a:picLocks noGrp="1" noChangeAspect="1"/>
+          </p:cNvPicPr>
+          <p:nvPr>
+            <p:ph idx="1"/>
+          </p:nvPr>
+        </p:nvPicPr>
+        <p:blipFill>
+          <a:blip r:embed="rId2"/>
+          <a:stretch>
+            <a:fillRect/>
+          </a:stretch>
+        </p:blipFill>
+        <p:spPr>
+          <a:xfrm>
+            <a:off x="838200" y="1837348"/>
+            <a:ext cx="9534899" cy="4351338"/>
+          </a:xfrm>
+        </p:spPr>
+      </p:pic>
+    </p:spTree>
+    <p:extLst>
+      <p:ext uri="{BB962C8B-B14F-4D97-AF65-F5344CB8AC3E}">
+        <p14:creationId xmlns:p14="http://schemas.microsoft.com/office/powerpoint/2010/main" val="61003641"/>
+      </p:ext>
+    </p:extLst>
+  </p:cSld>
+  <p:clrMapOvr>
+    <a:masterClrMapping/>
+  </p:clrMapOvr>
+</p:sld>
+</file>
+
+<file path=ppt/slides/slide16.xml><?xml version="1.0" encoding="utf-8"?>
+<p:sld xmlns:a="http://schemas.openxmlformats.org/drawingml/2006/main" xmlns:r="http://schemas.openxmlformats.org/officeDocument/2006/relationships" xmlns:p="http://schemas.openxmlformats.org/presentationml/2006/main">
+  <p:cSld>
+    <p:spTree>
+      <p:nvGrpSpPr>
+        <p:cNvPr id="1" name=""/>
+        <p:cNvGrpSpPr/>
+        <p:nvPr/>
+      </p:nvGrpSpPr>
+      <p:grpSpPr>
+        <a:xfrm>
+          <a:off x="0" y="0"/>
+          <a:ext cx="0" cy="0"/>
+          <a:chOff x="0" y="0"/>
+          <a:chExt cx="0" cy="0"/>
+        </a:xfrm>
+      </p:grpSpPr>
+      <p:sp>
+        <p:nvSpPr>
+          <p:cNvPr id="2" name="Title 1">
+            <a:extLst>
+              <a:ext uri="{FF2B5EF4-FFF2-40B4-BE49-F238E27FC236}">
+                <a16:creationId xmlns:a16="http://schemas.microsoft.com/office/drawing/2014/main" id="{B6C19BBE-8167-824E-945D-4285BF7608E0}"/>
+              </a:ext>
+            </a:extLst>
+          </p:cNvPr>
+          <p:cNvSpPr>
+            <a:spLocks noGrp="1"/>
+          </p:cNvSpPr>
+          <p:nvPr>
+            <p:ph type="title"/>
+          </p:nvPr>
+        </p:nvSpPr>
+        <p:spPr/>
+        <p:txBody>
+          <a:bodyPr/>
+          <a:lstStyle/>
+          <a:p>
+            <a:r>
+              <a:rPr lang="en-US" dirty="0">
+                <a:solidFill>
+                  <a:schemeClr val="bg1"/>
+                </a:solidFill>
+              </a:rPr>
+              <a:t>Setting up Data Store</a:t>
+            </a:r>
+          </a:p>
+        </p:txBody>
+      </p:sp>
+      <p:pic>
+        <p:nvPicPr>
+          <p:cNvPr id="5" name="Content Placeholder 4">
+            <a:extLst>
+              <a:ext uri="{FF2B5EF4-FFF2-40B4-BE49-F238E27FC236}">
+                <a16:creationId xmlns:a16="http://schemas.microsoft.com/office/drawing/2014/main" id="{9C042080-032E-7E45-96F2-0A31EC78FCA5}"/>
+              </a:ext>
+            </a:extLst>
+          </p:cNvPr>
+          <p:cNvPicPr>
+            <a:picLocks noGrp="1" noChangeAspect="1"/>
+          </p:cNvPicPr>
+          <p:nvPr>
+            <p:ph idx="1"/>
+          </p:nvPr>
+        </p:nvPicPr>
+        <p:blipFill>
+          <a:blip r:embed="rId2"/>
+          <a:stretch>
+            <a:fillRect/>
+          </a:stretch>
+        </p:blipFill>
+        <p:spPr>
+          <a:xfrm>
+            <a:off x="1016000" y="3398044"/>
+            <a:ext cx="10160000" cy="1206500"/>
+          </a:xfrm>
+        </p:spPr>
+      </p:pic>
+    </p:spTree>
+    <p:extLst>
+      <p:ext uri="{BB962C8B-B14F-4D97-AF65-F5344CB8AC3E}">
+        <p14:creationId xmlns:p14="http://schemas.microsoft.com/office/powerpoint/2010/main" val="1812661548"/>
+      </p:ext>
+    </p:extLst>
+  </p:cSld>
+  <p:clrMapOvr>
+    <a:masterClrMapping/>
+  </p:clrMapOvr>
+</p:sld>
+</file>
+
+<file path=ppt/slides/slide17.xml><?xml version="1.0" encoding="utf-8"?>
+<p:sld xmlns:a="http://schemas.openxmlformats.org/drawingml/2006/main" xmlns:r="http://schemas.openxmlformats.org/officeDocument/2006/relationships" xmlns:p="http://schemas.openxmlformats.org/presentationml/2006/main">
+  <p:cSld>
+    <p:spTree>
+      <p:nvGrpSpPr>
+        <p:cNvPr id="1" name=""/>
+        <p:cNvGrpSpPr/>
+        <p:nvPr/>
+      </p:nvGrpSpPr>
+      <p:grpSpPr>
+        <a:xfrm>
+          <a:off x="0" y="0"/>
+          <a:ext cx="0" cy="0"/>
+          <a:chOff x="0" y="0"/>
+          <a:chExt cx="0" cy="0"/>
+        </a:xfrm>
+      </p:grpSpPr>
+      <p:sp>
+        <p:nvSpPr>
+          <p:cNvPr id="2" name="Title 1">
+            <a:extLst>
+              <a:ext uri="{FF2B5EF4-FFF2-40B4-BE49-F238E27FC236}">
+                <a16:creationId xmlns:a16="http://schemas.microsoft.com/office/drawing/2014/main" id="{6EDD6ABD-17A2-174C-A1D6-0FFED93B764E}"/>
+              </a:ext>
+            </a:extLst>
+          </p:cNvPr>
+          <p:cNvSpPr>
+            <a:spLocks noGrp="1"/>
+          </p:cNvSpPr>
+          <p:nvPr>
+            <p:ph type="title"/>
+          </p:nvPr>
+        </p:nvSpPr>
+        <p:spPr/>
+        <p:txBody>
+          <a:bodyPr/>
+          <a:lstStyle/>
+          <a:p>
+            <a:r>
+              <a:rPr lang="en-US" dirty="0">
+                <a:solidFill>
+                  <a:schemeClr val="bg1"/>
+                </a:solidFill>
+              </a:rPr>
+              <a:t>Read value</a:t>
+            </a:r>
+          </a:p>
+        </p:txBody>
+      </p:sp>
+      <p:pic>
+        <p:nvPicPr>
+          <p:cNvPr id="5" name="Content Placeholder 4" descr="Text&#10;&#10;Description automatically generated with low confidence">
+            <a:extLst>
+              <a:ext uri="{FF2B5EF4-FFF2-40B4-BE49-F238E27FC236}">
+                <a16:creationId xmlns:a16="http://schemas.microsoft.com/office/drawing/2014/main" id="{AD2C6BC6-2360-BF48-A9D6-DAACDECDBB96}"/>
+              </a:ext>
+            </a:extLst>
+          </p:cNvPr>
+          <p:cNvPicPr>
+            <a:picLocks noGrp="1" noChangeAspect="1"/>
+          </p:cNvPicPr>
+          <p:nvPr>
+            <p:ph idx="1"/>
+          </p:nvPr>
+        </p:nvPicPr>
+        <p:blipFill>
+          <a:blip r:embed="rId2"/>
+          <a:stretch>
+            <a:fillRect/>
+          </a:stretch>
+        </p:blipFill>
+        <p:spPr>
+          <a:xfrm>
+            <a:off x="1035050" y="3334544"/>
+            <a:ext cx="10121900" cy="1333500"/>
+          </a:xfrm>
+        </p:spPr>
+      </p:pic>
+    </p:spTree>
+    <p:extLst>
+      <p:ext uri="{BB962C8B-B14F-4D97-AF65-F5344CB8AC3E}">
+        <p14:creationId xmlns:p14="http://schemas.microsoft.com/office/powerpoint/2010/main" val="2763470361"/>
+      </p:ext>
+    </p:extLst>
+  </p:cSld>
+  <p:clrMapOvr>
+    <a:masterClrMapping/>
+  </p:clrMapOvr>
+</p:sld>
+</file>
+
+<file path=ppt/slides/slide18.xml><?xml version="1.0" encoding="utf-8"?>
+<p:sld xmlns:a="http://schemas.openxmlformats.org/drawingml/2006/main" xmlns:r="http://schemas.openxmlformats.org/officeDocument/2006/relationships" xmlns:p="http://schemas.openxmlformats.org/presentationml/2006/main">
+  <p:cSld>
+    <p:spTree>
+      <p:nvGrpSpPr>
+        <p:cNvPr id="1" name=""/>
+        <p:cNvGrpSpPr/>
+        <p:nvPr/>
+      </p:nvGrpSpPr>
+      <p:grpSpPr>
+        <a:xfrm>
+          <a:off x="0" y="0"/>
+          <a:ext cx="0" cy="0"/>
+          <a:chOff x="0" y="0"/>
+          <a:chExt cx="0" cy="0"/>
+        </a:xfrm>
+      </p:grpSpPr>
+      <p:sp>
+        <p:nvSpPr>
+          <p:cNvPr id="2" name="Title 1">
+            <a:extLst>
+              <a:ext uri="{FF2B5EF4-FFF2-40B4-BE49-F238E27FC236}">
+                <a16:creationId xmlns:a16="http://schemas.microsoft.com/office/drawing/2014/main" id="{18E887B6-097B-3B42-9ADE-B132E2E27692}"/>
+              </a:ext>
+            </a:extLst>
+          </p:cNvPr>
+          <p:cNvSpPr>
+            <a:spLocks noGrp="1"/>
+          </p:cNvSpPr>
+          <p:nvPr>
+            <p:ph type="title"/>
+          </p:nvPr>
+        </p:nvSpPr>
+        <p:spPr/>
+        <p:txBody>
+          <a:bodyPr/>
+          <a:lstStyle/>
+          <a:p>
+            <a:r>
+              <a:rPr lang="en-US" dirty="0">
+                <a:solidFill>
+                  <a:schemeClr val="bg1"/>
+                </a:solidFill>
+              </a:rPr>
+              <a:t>Update value</a:t>
+            </a:r>
+          </a:p>
+        </p:txBody>
+      </p:sp>
+      <p:pic>
+        <p:nvPicPr>
+          <p:cNvPr id="5" name="Content Placeholder 4" descr="Text&#10;&#10;Description automatically generated">
+            <a:extLst>
+              <a:ext uri="{FF2B5EF4-FFF2-40B4-BE49-F238E27FC236}">
+                <a16:creationId xmlns:a16="http://schemas.microsoft.com/office/drawing/2014/main" id="{71F73B10-44FA-334F-B4E3-4C30E8079B90}"/>
+              </a:ext>
+            </a:extLst>
+          </p:cNvPr>
+          <p:cNvPicPr>
+            <a:picLocks noGrp="1" noChangeAspect="1"/>
+          </p:cNvPicPr>
+          <p:nvPr>
+            <p:ph idx="1"/>
+          </p:nvPr>
+        </p:nvPicPr>
+        <p:blipFill>
+          <a:blip r:embed="rId2"/>
+          <a:stretch>
+            <a:fillRect/>
+          </a:stretch>
+        </p:blipFill>
+        <p:spPr>
+          <a:xfrm>
+            <a:off x="1028700" y="3201194"/>
+            <a:ext cx="10134600" cy="1600200"/>
+          </a:xfrm>
+        </p:spPr>
+      </p:pic>
+    </p:spTree>
+    <p:extLst>
+      <p:ext uri="{BB962C8B-B14F-4D97-AF65-F5344CB8AC3E}">
+        <p14:creationId xmlns:p14="http://schemas.microsoft.com/office/powerpoint/2010/main" val="2866298093"/>
+      </p:ext>
+    </p:extLst>
+  </p:cSld>
+  <p:clrMapOvr>
+    <a:masterClrMapping/>
+  </p:clrMapOvr>
+</p:sld>
+</file>
+
+<file path=ppt/slides/slide19.xml><?xml version="1.0" encoding="utf-8"?>
+<p:sld xmlns:a="http://schemas.openxmlformats.org/drawingml/2006/main" xmlns:r="http://schemas.openxmlformats.org/officeDocument/2006/relationships" xmlns:p="http://schemas.openxmlformats.org/presentationml/2006/main">
+  <p:cSld>
+    <p:spTree>
+      <p:nvGrpSpPr>
+        <p:cNvPr id="1" name=""/>
+        <p:cNvGrpSpPr/>
+        <p:nvPr/>
+      </p:nvGrpSpPr>
+      <p:grpSpPr>
+        <a:xfrm>
+          <a:off x="0" y="0"/>
+          <a:ext cx="0" cy="0"/>
+          <a:chOff x="0" y="0"/>
+          <a:chExt cx="0" cy="0"/>
+        </a:xfrm>
+      </p:grpSpPr>
+      <p:sp>
+        <p:nvSpPr>
+          <p:cNvPr id="2" name="Title 1">
+            <a:extLst>
+              <a:ext uri="{FF2B5EF4-FFF2-40B4-BE49-F238E27FC236}">
+                <a16:creationId xmlns:a16="http://schemas.microsoft.com/office/drawing/2014/main" id="{9559A34D-D6EF-B744-8F89-1C4970CA56DD}"/>
+              </a:ext>
+            </a:extLst>
+          </p:cNvPr>
+          <p:cNvSpPr>
+            <a:spLocks noGrp="1"/>
+          </p:cNvSpPr>
+          <p:nvPr>
+            <p:ph type="title"/>
+          </p:nvPr>
+        </p:nvSpPr>
+        <p:spPr/>
+        <p:txBody>
+          <a:bodyPr/>
+          <a:lstStyle/>
+          <a:p>
+            <a:r>
+              <a:rPr lang="en-US" dirty="0">
+                <a:solidFill>
+                  <a:schemeClr val="bg1"/>
+                </a:solidFill>
+              </a:rPr>
+              <a:t>Clear settings</a:t>
+            </a:r>
+          </a:p>
+        </p:txBody>
+      </p:sp>
+      <p:pic>
+        <p:nvPicPr>
+          <p:cNvPr id="5" name="Content Placeholder 4" descr="Text&#10;&#10;Description automatically generated">
+            <a:extLst>
+              <a:ext uri="{FF2B5EF4-FFF2-40B4-BE49-F238E27FC236}">
+                <a16:creationId xmlns:a16="http://schemas.microsoft.com/office/drawing/2014/main" id="{881B41A0-B115-8E4F-8F9D-ADE17CF26955}"/>
+              </a:ext>
+            </a:extLst>
+          </p:cNvPr>
+          <p:cNvPicPr>
+            <a:picLocks noGrp="1" noChangeAspect="1"/>
+          </p:cNvPicPr>
+          <p:nvPr>
+            <p:ph idx="1"/>
+          </p:nvPr>
+        </p:nvPicPr>
+        <p:blipFill>
+          <a:blip r:embed="rId2"/>
+          <a:stretch>
+            <a:fillRect/>
+          </a:stretch>
+        </p:blipFill>
+        <p:spPr>
+          <a:xfrm>
+            <a:off x="1016000" y="3283744"/>
+            <a:ext cx="10160000" cy="1435100"/>
+          </a:xfrm>
+        </p:spPr>
+      </p:pic>
+    </p:spTree>
+    <p:extLst>
+      <p:ext uri="{BB962C8B-B14F-4D97-AF65-F5344CB8AC3E}">
+        <p14:creationId xmlns:p14="http://schemas.microsoft.com/office/powerpoint/2010/main" val="1245152988"/>
       </p:ext>
     </p:extLst>
   </p:cSld>
@@ -3976,6 +4705,392 @@
     <p:extLst>
       <p:ext uri="{BB962C8B-B14F-4D97-AF65-F5344CB8AC3E}">
         <p14:creationId xmlns:p14="http://schemas.microsoft.com/office/powerpoint/2010/main" val="3224420675"/>
+      </p:ext>
+    </p:extLst>
+  </p:cSld>
+  <p:clrMapOvr>
+    <a:masterClrMapping/>
+  </p:clrMapOvr>
+</p:sld>
+</file>
+
+<file path=ppt/slides/slide20.xml><?xml version="1.0" encoding="utf-8"?>
+<p:sld xmlns:a="http://schemas.openxmlformats.org/drawingml/2006/main" xmlns:r="http://schemas.openxmlformats.org/officeDocument/2006/relationships" xmlns:p="http://schemas.openxmlformats.org/presentationml/2006/main">
+  <p:cSld>
+    <p:spTree>
+      <p:nvGrpSpPr>
+        <p:cNvPr id="1" name=""/>
+        <p:cNvGrpSpPr/>
+        <p:nvPr/>
+      </p:nvGrpSpPr>
+      <p:grpSpPr>
+        <a:xfrm>
+          <a:off x="0" y="0"/>
+          <a:ext cx="0" cy="0"/>
+          <a:chOff x="0" y="0"/>
+          <a:chExt cx="0" cy="0"/>
+        </a:xfrm>
+      </p:grpSpPr>
+      <p:sp>
+        <p:nvSpPr>
+          <p:cNvPr id="2" name="Title 1">
+            <a:extLst>
+              <a:ext uri="{FF2B5EF4-FFF2-40B4-BE49-F238E27FC236}">
+                <a16:creationId xmlns:a16="http://schemas.microsoft.com/office/drawing/2014/main" id="{00F48E8F-9103-5844-A3F8-509B05A6156F}"/>
+              </a:ext>
+            </a:extLst>
+          </p:cNvPr>
+          <p:cNvSpPr>
+            <a:spLocks noGrp="1"/>
+          </p:cNvSpPr>
+          <p:nvPr>
+            <p:ph type="title"/>
+          </p:nvPr>
+        </p:nvSpPr>
+        <p:spPr/>
+        <p:txBody>
+          <a:bodyPr/>
+          <a:lstStyle/>
+          <a:p>
+            <a:r>
+              <a:rPr lang="en-US" dirty="0">
+                <a:solidFill>
+                  <a:schemeClr val="bg1"/>
+                </a:solidFill>
+              </a:rPr>
+              <a:t>Synchronous call to fetch a value</a:t>
+            </a:r>
+          </a:p>
+        </p:txBody>
+      </p:sp>
+      <p:pic>
+        <p:nvPicPr>
+          <p:cNvPr id="5" name="Content Placeholder 4">
+            <a:extLst>
+              <a:ext uri="{FF2B5EF4-FFF2-40B4-BE49-F238E27FC236}">
+                <a16:creationId xmlns:a16="http://schemas.microsoft.com/office/drawing/2014/main" id="{C56A5EDB-904A-3E47-95BC-E7E5D28DC119}"/>
+              </a:ext>
+            </a:extLst>
+          </p:cNvPr>
+          <p:cNvPicPr>
+            <a:picLocks noGrp="1" noChangeAspect="1"/>
+          </p:cNvPicPr>
+          <p:nvPr>
+            <p:ph idx="1"/>
+          </p:nvPr>
+        </p:nvPicPr>
+        <p:blipFill>
+          <a:blip r:embed="rId2"/>
+          <a:stretch>
+            <a:fillRect/>
+          </a:stretch>
+        </p:blipFill>
+        <p:spPr>
+          <a:xfrm>
+            <a:off x="1041400" y="3709194"/>
+            <a:ext cx="10109200" cy="584200"/>
+          </a:xfrm>
+        </p:spPr>
+      </p:pic>
+    </p:spTree>
+    <p:extLst>
+      <p:ext uri="{BB962C8B-B14F-4D97-AF65-F5344CB8AC3E}">
+        <p14:creationId xmlns:p14="http://schemas.microsoft.com/office/powerpoint/2010/main" val="2386591546"/>
+      </p:ext>
+    </p:extLst>
+  </p:cSld>
+  <p:clrMapOvr>
+    <a:masterClrMapping/>
+  </p:clrMapOvr>
+</p:sld>
+</file>
+
+<file path=ppt/slides/slide21.xml><?xml version="1.0" encoding="utf-8"?>
+<p:sld xmlns:a="http://schemas.openxmlformats.org/drawingml/2006/main" xmlns:r="http://schemas.openxmlformats.org/officeDocument/2006/relationships" xmlns:p="http://schemas.openxmlformats.org/presentationml/2006/main">
+  <p:cSld>
+    <p:spTree>
+      <p:nvGrpSpPr>
+        <p:cNvPr id="1" name=""/>
+        <p:cNvGrpSpPr/>
+        <p:nvPr/>
+      </p:nvGrpSpPr>
+      <p:grpSpPr>
+        <a:xfrm>
+          <a:off x="0" y="0"/>
+          <a:ext cx="0" cy="0"/>
+          <a:chOff x="0" y="0"/>
+          <a:chExt cx="0" cy="0"/>
+        </a:xfrm>
+      </p:grpSpPr>
+      <p:sp>
+        <p:nvSpPr>
+          <p:cNvPr id="2" name="Title 1">
+            <a:extLst>
+              <a:ext uri="{FF2B5EF4-FFF2-40B4-BE49-F238E27FC236}">
+                <a16:creationId xmlns:a16="http://schemas.microsoft.com/office/drawing/2014/main" id="{5544D4B1-B9CB-C144-9AC8-3505CE893F17}"/>
+              </a:ext>
+            </a:extLst>
+          </p:cNvPr>
+          <p:cNvSpPr>
+            <a:spLocks noGrp="1"/>
+          </p:cNvSpPr>
+          <p:nvPr>
+            <p:ph type="title"/>
+          </p:nvPr>
+        </p:nvSpPr>
+        <p:spPr/>
+        <p:txBody>
+          <a:bodyPr/>
+          <a:lstStyle/>
+          <a:p>
+            <a:r>
+              <a:rPr lang="en-US" dirty="0">
+                <a:solidFill>
+                  <a:schemeClr val="bg1"/>
+                </a:solidFill>
+              </a:rPr>
+              <a:t>How to use data store as a form of Data Model</a:t>
+            </a:r>
+          </a:p>
+        </p:txBody>
+      </p:sp>
+      <p:pic>
+        <p:nvPicPr>
+          <p:cNvPr id="5" name="Content Placeholder 4" descr="Text&#10;&#10;Description automatically generated">
+            <a:extLst>
+              <a:ext uri="{FF2B5EF4-FFF2-40B4-BE49-F238E27FC236}">
+                <a16:creationId xmlns:a16="http://schemas.microsoft.com/office/drawing/2014/main" id="{46D7FA9D-68A4-7440-BCD2-A8F4001B8C99}"/>
+              </a:ext>
+            </a:extLst>
+          </p:cNvPr>
+          <p:cNvPicPr>
+            <a:picLocks noGrp="1" noChangeAspect="1"/>
+          </p:cNvPicPr>
+          <p:nvPr>
+            <p:ph idx="1"/>
+          </p:nvPr>
+        </p:nvPicPr>
+        <p:blipFill>
+          <a:blip r:embed="rId2"/>
+          <a:stretch>
+            <a:fillRect/>
+          </a:stretch>
+        </p:blipFill>
+        <p:spPr>
+          <a:xfrm>
+            <a:off x="2148293" y="1825625"/>
+            <a:ext cx="7895414" cy="4351338"/>
+          </a:xfrm>
+        </p:spPr>
+      </p:pic>
+    </p:spTree>
+    <p:extLst>
+      <p:ext uri="{BB962C8B-B14F-4D97-AF65-F5344CB8AC3E}">
+        <p14:creationId xmlns:p14="http://schemas.microsoft.com/office/powerpoint/2010/main" val="4212326881"/>
+      </p:ext>
+    </p:extLst>
+  </p:cSld>
+  <p:clrMapOvr>
+    <a:masterClrMapping/>
+  </p:clrMapOvr>
+</p:sld>
+</file>
+
+<file path=ppt/slides/slide22.xml><?xml version="1.0" encoding="utf-8"?>
+<p:sld xmlns:a="http://schemas.openxmlformats.org/drawingml/2006/main" xmlns:r="http://schemas.openxmlformats.org/officeDocument/2006/relationships" xmlns:p="http://schemas.openxmlformats.org/presentationml/2006/main" showMasterSp="0">
+  <p:cSld>
+    <p:spTree>
+      <p:nvGrpSpPr>
+        <p:cNvPr id="1" name=""/>
+        <p:cNvGrpSpPr/>
+        <p:nvPr/>
+      </p:nvGrpSpPr>
+      <p:grpSpPr>
+        <a:xfrm>
+          <a:off x="0" y="0"/>
+          <a:ext cx="0" cy="0"/>
+          <a:chOff x="0" y="0"/>
+          <a:chExt cx="0" cy="0"/>
+        </a:xfrm>
+      </p:grpSpPr>
+      <p:sp>
+        <p:nvSpPr>
+          <p:cNvPr id="2" name="Title 1">
+            <a:extLst>
+              <a:ext uri="{FF2B5EF4-FFF2-40B4-BE49-F238E27FC236}">
+                <a16:creationId xmlns:a16="http://schemas.microsoft.com/office/drawing/2014/main" id="{59BE37D6-92C7-FC4B-8C71-0418BCAED9C0}"/>
+              </a:ext>
+            </a:extLst>
+          </p:cNvPr>
+          <p:cNvSpPr>
+            <a:spLocks noGrp="1"/>
+          </p:cNvSpPr>
+          <p:nvPr>
+            <p:ph type="title"/>
+          </p:nvPr>
+        </p:nvSpPr>
+        <p:spPr>
+          <a:xfrm>
+            <a:off x="838200" y="2766218"/>
+            <a:ext cx="10515600" cy="1325563"/>
+          </a:xfrm>
+        </p:spPr>
+        <p:txBody>
+          <a:bodyPr/>
+          <a:lstStyle/>
+          <a:p>
+            <a:pPr algn="ctr"/>
+            <a:r>
+              <a:rPr lang="en-US" dirty="0">
+                <a:solidFill>
+                  <a:schemeClr val="bg1"/>
+                </a:solidFill>
+              </a:rPr>
+              <a:t>Demo</a:t>
+            </a:r>
+          </a:p>
+        </p:txBody>
+      </p:sp>
+    </p:spTree>
+    <p:extLst>
+      <p:ext uri="{BB962C8B-B14F-4D97-AF65-F5344CB8AC3E}">
+        <p14:creationId xmlns:p14="http://schemas.microsoft.com/office/powerpoint/2010/main" val="3423347409"/>
+      </p:ext>
+    </p:extLst>
+  </p:cSld>
+  <p:clrMapOvr>
+    <a:masterClrMapping/>
+  </p:clrMapOvr>
+</p:sld>
+</file>
+
+<file path=ppt/slides/slide23.xml><?xml version="1.0" encoding="utf-8"?>
+<p:sld xmlns:a="http://schemas.openxmlformats.org/drawingml/2006/main" xmlns:r="http://schemas.openxmlformats.org/officeDocument/2006/relationships" xmlns:p="http://schemas.openxmlformats.org/presentationml/2006/main" showMasterSp="0">
+  <p:cSld>
+    <p:spTree>
+      <p:nvGrpSpPr>
+        <p:cNvPr id="1" name=""/>
+        <p:cNvGrpSpPr/>
+        <p:nvPr/>
+      </p:nvGrpSpPr>
+      <p:grpSpPr>
+        <a:xfrm>
+          <a:off x="0" y="0"/>
+          <a:ext cx="0" cy="0"/>
+          <a:chOff x="0" y="0"/>
+          <a:chExt cx="0" cy="0"/>
+        </a:xfrm>
+      </p:grpSpPr>
+      <p:sp>
+        <p:nvSpPr>
+          <p:cNvPr id="2" name="Title 1">
+            <a:extLst>
+              <a:ext uri="{FF2B5EF4-FFF2-40B4-BE49-F238E27FC236}">
+                <a16:creationId xmlns:a16="http://schemas.microsoft.com/office/drawing/2014/main" id="{4576B776-6CFC-304C-95F3-56984D283CEA}"/>
+              </a:ext>
+            </a:extLst>
+          </p:cNvPr>
+          <p:cNvSpPr>
+            <a:spLocks noGrp="1"/>
+          </p:cNvSpPr>
+          <p:nvPr>
+            <p:ph type="title"/>
+          </p:nvPr>
+        </p:nvSpPr>
+        <p:spPr>
+          <a:xfrm>
+            <a:off x="838200" y="2766218"/>
+            <a:ext cx="10515600" cy="1325563"/>
+          </a:xfrm>
+        </p:spPr>
+        <p:txBody>
+          <a:bodyPr/>
+          <a:lstStyle/>
+          <a:p>
+            <a:pPr algn="ctr"/>
+            <a:r>
+              <a:rPr lang="en-US" dirty="0">
+                <a:solidFill>
+                  <a:schemeClr val="bg1"/>
+                </a:solidFill>
+              </a:rPr>
+              <a:t>Questions?</a:t>
+            </a:r>
+          </a:p>
+        </p:txBody>
+      </p:sp>
+    </p:spTree>
+    <p:extLst>
+      <p:ext uri="{BB962C8B-B14F-4D97-AF65-F5344CB8AC3E}">
+        <p14:creationId xmlns:p14="http://schemas.microsoft.com/office/powerpoint/2010/main" val="2149673806"/>
+      </p:ext>
+    </p:extLst>
+  </p:cSld>
+  <p:clrMapOvr>
+    <a:masterClrMapping/>
+  </p:clrMapOvr>
+</p:sld>
+</file>
+
+<file path=ppt/slides/slide24.xml><?xml version="1.0" encoding="utf-8"?>
+<p:sld xmlns:a="http://schemas.openxmlformats.org/drawingml/2006/main" xmlns:r="http://schemas.openxmlformats.org/officeDocument/2006/relationships" xmlns:p="http://schemas.openxmlformats.org/presentationml/2006/main" showMasterSp="0">
+  <p:cSld>
+    <p:spTree>
+      <p:nvGrpSpPr>
+        <p:cNvPr id="1" name=""/>
+        <p:cNvGrpSpPr/>
+        <p:nvPr/>
+      </p:nvGrpSpPr>
+      <p:grpSpPr>
+        <a:xfrm>
+          <a:off x="0" y="0"/>
+          <a:ext cx="0" cy="0"/>
+          <a:chOff x="0" y="0"/>
+          <a:chExt cx="0" cy="0"/>
+        </a:xfrm>
+      </p:grpSpPr>
+      <p:sp>
+        <p:nvSpPr>
+          <p:cNvPr id="2" name="Title 1">
+            <a:extLst>
+              <a:ext uri="{FF2B5EF4-FFF2-40B4-BE49-F238E27FC236}">
+                <a16:creationId xmlns:a16="http://schemas.microsoft.com/office/drawing/2014/main" id="{F86059A6-12B3-D243-BD3E-7F9EB6780670}"/>
+              </a:ext>
+            </a:extLst>
+          </p:cNvPr>
+          <p:cNvSpPr>
+            <a:spLocks noGrp="1"/>
+          </p:cNvSpPr>
+          <p:nvPr>
+            <p:ph type="title"/>
+          </p:nvPr>
+        </p:nvSpPr>
+        <p:spPr>
+          <a:xfrm>
+            <a:off x="838200" y="2766218"/>
+            <a:ext cx="10515600" cy="1325563"/>
+          </a:xfrm>
+        </p:spPr>
+        <p:txBody>
+          <a:bodyPr/>
+          <a:lstStyle/>
+          <a:p>
+            <a:pPr algn="ctr"/>
+            <a:r>
+              <a:rPr lang="en-US" dirty="0">
+                <a:solidFill>
+                  <a:schemeClr val="bg1"/>
+                </a:solidFill>
+              </a:rPr>
+              <a:t>Thank you!</a:t>
+            </a:r>
+          </a:p>
+        </p:txBody>
+      </p:sp>
+    </p:spTree>
+    <p:extLst>
+      <p:ext uri="{BB962C8B-B14F-4D97-AF65-F5344CB8AC3E}">
+        <p14:creationId xmlns:p14="http://schemas.microsoft.com/office/powerpoint/2010/main" val="2977985380"/>
       </p:ext>
     </p:extLst>
   </p:cSld>
@@ -4209,7 +5324,7 @@
       </p:sp>
       <p:pic>
         <p:nvPicPr>
-          <p:cNvPr id="5" name="Content Placeholder 4" descr="Table&#10;&#10;Description automatically generated">
+          <p:cNvPr id="5" name="Content Placeholder 4">
             <a:extLst>
               <a:ext uri="{FF2B5EF4-FFF2-40B4-BE49-F238E27FC236}">
                 <a16:creationId xmlns:a16="http://schemas.microsoft.com/office/drawing/2014/main" id="{A7941B29-74E8-DE4B-8467-9C4142E1B99B}"/>
@@ -4225,14 +5340,13 @@
         </p:nvPicPr>
         <p:blipFill>
           <a:blip r:embed="rId2"/>
-          <a:stretch>
-            <a:fillRect/>
-          </a:stretch>
+          <a:srcRect/>
+          <a:stretch/>
         </p:blipFill>
         <p:spPr>
           <a:xfrm>
-            <a:off x="838199" y="1223778"/>
-            <a:ext cx="9294840" cy="5112162"/>
+            <a:off x="2660905" y="1223778"/>
+            <a:ext cx="6330695" cy="5112162"/>
           </a:xfrm>
           <a:prstGeom prst="rect">
             <a:avLst/>

</xml_diff>